<commit_message>
Design procedure is going on for zvrt switching buck converter.
</commit_message>
<xml_diff>
--- a/Weekly Reports/2019.09.04 - 2019.09.11 Report.pptx
+++ b/Weekly Reports/2019.09.04 - 2019.09.11 Report.pptx
@@ -5,7 +5,7 @@
     <p:sldMasterId id="2147483648" r:id="rId1"/>
   </p:sldMasterIdLst>
   <p:notesMasterIdLst>
-    <p:notesMasterId r:id="rId9"/>
+    <p:notesMasterId r:id="rId16"/>
   </p:notesMasterIdLst>
   <p:sldIdLst>
     <p:sldId id="256" r:id="rId2"/>
@@ -15,6 +15,13 @@
     <p:sldId id="260" r:id="rId6"/>
     <p:sldId id="261" r:id="rId7"/>
     <p:sldId id="262" r:id="rId8"/>
+    <p:sldId id="263" r:id="rId9"/>
+    <p:sldId id="264" r:id="rId10"/>
+    <p:sldId id="265" r:id="rId11"/>
+    <p:sldId id="266" r:id="rId12"/>
+    <p:sldId id="267" r:id="rId13"/>
+    <p:sldId id="268" r:id="rId14"/>
+    <p:sldId id="269" r:id="rId15"/>
   </p:sldIdLst>
   <p:sldSz cx="12192000" cy="6858000"/>
   <p:notesSz cx="6858000" cy="9144000"/>
@@ -113,6 +120,11 @@
       </a:defRPr>
     </a:lvl9pPr>
   </p:defaultTextStyle>
+  <p:extLst>
+    <p:ext uri="{EFAFB233-063F-42B5-8137-9DF3F51BA10A}">
+      <p15:sldGuideLst xmlns:p15="http://schemas.microsoft.com/office/powerpoint/2012/main"/>
+    </p:ext>
+  </p:extLst>
 </p:presentation>
 </file>
 
@@ -3720,8 +3732,8 @@
           </a:p>
         </p:txBody>
       </p:sp>
-      <mc:AlternateContent xmlns:mc="http://schemas.openxmlformats.org/markup-compatibility/2006">
-        <mc:Choice xmlns:a14="http://schemas.microsoft.com/office/drawing/2010/main" Requires="a14">
+      <mc:AlternateContent xmlns:mc="http://schemas.openxmlformats.org/markup-compatibility/2006" xmlns:a14="http://schemas.microsoft.com/office/drawing/2010/main">
+        <mc:Choice Requires="a14">
           <p:sp>
             <p:nvSpPr>
               <p:cNvPr id="19" name="TextBox 18"/>
@@ -3744,6 +3756,7 @@
               </a:bodyPr>
               <a:lstStyle/>
               <a:p>
+                <a:pPr/>
                 <a14:m>
                   <m:oMathPara xmlns:m="http://schemas.openxmlformats.org/officeDocument/2006/math">
                     <m:oMathParaPr>
@@ -3899,7 +3912,7 @@
             </p:txBody>
           </p:sp>
         </mc:Choice>
-        <mc:Fallback>
+        <mc:Fallback xmlns="">
           <p:sp>
             <p:nvSpPr>
               <p:cNvPr id="19" name="TextBox 18"/>
@@ -3938,8 +3951,8 @@
           </p:sp>
         </mc:Fallback>
       </mc:AlternateContent>
-      <mc:AlternateContent xmlns:mc="http://schemas.openxmlformats.org/markup-compatibility/2006">
-        <mc:Choice xmlns:a14="http://schemas.microsoft.com/office/drawing/2010/main" Requires="a14">
+      <mc:AlternateContent xmlns:mc="http://schemas.openxmlformats.org/markup-compatibility/2006" xmlns:a14="http://schemas.microsoft.com/office/drawing/2010/main">
+        <mc:Choice Requires="a14">
           <p:sp>
             <p:nvSpPr>
               <p:cNvPr id="20" name="TextBox 19"/>
@@ -3962,6 +3975,7 @@
               </a:bodyPr>
               <a:lstStyle/>
               <a:p>
+                <a:pPr/>
                 <a14:m>
                   <m:oMathPara xmlns:m="http://schemas.openxmlformats.org/officeDocument/2006/math">
                     <m:oMathParaPr>
@@ -4068,7 +4082,7 @@
             </p:txBody>
           </p:sp>
         </mc:Choice>
-        <mc:Fallback>
+        <mc:Fallback xmlns="">
           <p:sp>
             <p:nvSpPr>
               <p:cNvPr id="20" name="TextBox 19"/>
@@ -4157,6 +4171,2495 @@
   <p:clrMapOvr>
     <a:masterClrMapping/>
   </p:clrMapOvr>
+  <p:timing>
+    <p:tnLst>
+      <p:par>
+        <p:cTn id="1" dur="indefinite" restart="never" nodeType="tmRoot"/>
+      </p:par>
+    </p:tnLst>
+  </p:timing>
+</p:sld>
+</file>
+
+<file path=ppt/slides/slide10.xml><?xml version="1.0" encoding="utf-8"?>
+<p:sld xmlns:a="http://schemas.openxmlformats.org/drawingml/2006/main" xmlns:r="http://schemas.openxmlformats.org/officeDocument/2006/relationships" xmlns:p="http://schemas.openxmlformats.org/presentationml/2006/main">
+  <p:cSld>
+    <p:spTree>
+      <p:nvGrpSpPr>
+        <p:cNvPr id="1" name=""/>
+        <p:cNvGrpSpPr/>
+        <p:nvPr/>
+      </p:nvGrpSpPr>
+      <p:grpSpPr>
+        <a:xfrm>
+          <a:off x="0" y="0"/>
+          <a:ext cx="0" cy="0"/>
+          <a:chOff x="0" y="0"/>
+          <a:chExt cx="0" cy="0"/>
+        </a:xfrm>
+      </p:grpSpPr>
+      <p:pic>
+        <p:nvPicPr>
+          <p:cNvPr id="8" name="Picture 7"/>
+          <p:cNvPicPr>
+            <a:picLocks noChangeAspect="1"/>
+          </p:cNvPicPr>
+          <p:nvPr/>
+        </p:nvPicPr>
+        <p:blipFill>
+          <a:blip r:embed="rId2"/>
+          <a:stretch>
+            <a:fillRect/>
+          </a:stretch>
+        </p:blipFill>
+        <p:spPr>
+          <a:xfrm>
+            <a:off x="6281738" y="1608537"/>
+            <a:ext cx="5133975" cy="4267200"/>
+          </a:xfrm>
+          <a:prstGeom prst="rect">
+            <a:avLst/>
+          </a:prstGeom>
+        </p:spPr>
+      </p:pic>
+      <p:pic>
+        <p:nvPicPr>
+          <p:cNvPr id="7" name="Picture 6"/>
+          <p:cNvPicPr>
+            <a:picLocks noChangeAspect="1"/>
+          </p:cNvPicPr>
+          <p:nvPr/>
+        </p:nvPicPr>
+        <p:blipFill>
+          <a:blip r:embed="rId3"/>
+          <a:stretch>
+            <a:fillRect/>
+          </a:stretch>
+        </p:blipFill>
+        <p:spPr>
+          <a:xfrm>
+            <a:off x="376237" y="1608537"/>
+            <a:ext cx="5133975" cy="4267200"/>
+          </a:xfrm>
+          <a:prstGeom prst="rect">
+            <a:avLst/>
+          </a:prstGeom>
+        </p:spPr>
+      </p:pic>
+      <p:sp>
+        <p:nvSpPr>
+          <p:cNvPr id="4" name="Slide Number Placeholder 3"/>
+          <p:cNvSpPr>
+            <a:spLocks noGrp="1"/>
+          </p:cNvSpPr>
+          <p:nvPr>
+            <p:ph type="sldNum" sz="quarter" idx="12"/>
+          </p:nvPr>
+        </p:nvSpPr>
+        <p:spPr/>
+        <p:txBody>
+          <a:bodyPr/>
+          <a:lstStyle/>
+          <a:p>
+            <a:fld id="{178508F5-8E49-4F57-B165-331DE2AB85B8}" type="slidenum">
+              <a:rPr lang="tr-TR" sz="1800" smtClean="0"/>
+              <a:t>10</a:t>
+            </a:fld>
+            <a:endParaRPr lang="tr-TR" dirty="0"/>
+          </a:p>
+        </p:txBody>
+      </p:sp>
+      <p:sp>
+        <p:nvSpPr>
+          <p:cNvPr id="5" name="TextBox 4"/>
+          <p:cNvSpPr txBox="1"/>
+          <p:nvPr/>
+        </p:nvSpPr>
+        <p:spPr>
+          <a:xfrm>
+            <a:off x="562707" y="316523"/>
+            <a:ext cx="2558562" cy="461665"/>
+          </a:xfrm>
+          <a:prstGeom prst="rect">
+            <a:avLst/>
+          </a:prstGeom>
+          <a:noFill/>
+        </p:spPr>
+        <p:txBody>
+          <a:bodyPr wrap="square" rtlCol="0">
+            <a:spAutoFit/>
+          </a:bodyPr>
+          <a:lstStyle/>
+          <a:p>
+            <a:r>
+              <a:rPr lang="tr-TR" sz="2400" dirty="0" smtClean="0"/>
+              <a:t>Simulation Study</a:t>
+            </a:r>
+            <a:endParaRPr lang="tr-TR" sz="2400" dirty="0"/>
+          </a:p>
+        </p:txBody>
+      </p:sp>
+      <p:sp>
+        <p:nvSpPr>
+          <p:cNvPr id="2" name="TextBox 1"/>
+          <p:cNvSpPr txBox="1"/>
+          <p:nvPr/>
+        </p:nvSpPr>
+        <p:spPr>
+          <a:xfrm>
+            <a:off x="3800475" y="85690"/>
+            <a:ext cx="3419475" cy="1200329"/>
+          </a:xfrm>
+          <a:prstGeom prst="rect">
+            <a:avLst/>
+          </a:prstGeom>
+          <a:noFill/>
+        </p:spPr>
+        <p:txBody>
+          <a:bodyPr wrap="square" rtlCol="0">
+            <a:spAutoFit/>
+          </a:bodyPr>
+          <a:lstStyle/>
+          <a:p>
+            <a:r>
+              <a:rPr lang="tr-TR" dirty="0" smtClean="0"/>
+              <a:t>K = 4 -&gt; </a:t>
+            </a:r>
+            <a:r>
+              <a:rPr lang="tr-TR" b="1" dirty="0" smtClean="0"/>
+              <a:t>Synch. switch</a:t>
+            </a:r>
+            <a:br>
+              <a:rPr lang="tr-TR" b="1" dirty="0" smtClean="0"/>
+            </a:br>
+            <a:r>
+              <a:rPr lang="tr-TR" dirty="0" smtClean="0"/>
+              <a:t>Vin = 540V</a:t>
+            </a:r>
+          </a:p>
+          <a:p>
+            <a:r>
+              <a:rPr lang="tr-TR" dirty="0" smtClean="0"/>
+              <a:t>Vout </a:t>
+            </a:r>
+            <a:r>
+              <a:rPr lang="tr-TR" dirty="0"/>
+              <a:t>= </a:t>
+            </a:r>
+            <a:r>
+              <a:rPr lang="tr-TR" dirty="0" smtClean="0"/>
+              <a:t>400V, Pout = 8 kW </a:t>
+            </a:r>
+          </a:p>
+          <a:p>
+            <a:r>
+              <a:rPr lang="tr-TR" dirty="0"/>
+              <a:t>fsw = 100 </a:t>
+            </a:r>
+            <a:r>
+              <a:rPr lang="tr-TR" dirty="0" smtClean="0"/>
+              <a:t>kHz, Tj = 25˚C</a:t>
+            </a:r>
+            <a:endParaRPr lang="tr-TR" dirty="0"/>
+          </a:p>
+        </p:txBody>
+      </p:sp>
+      <p:sp>
+        <p:nvSpPr>
+          <p:cNvPr id="9" name="TextBox 8"/>
+          <p:cNvSpPr txBox="1"/>
+          <p:nvPr/>
+        </p:nvSpPr>
+        <p:spPr>
+          <a:xfrm>
+            <a:off x="2324100" y="1126093"/>
+            <a:ext cx="1943100" cy="369332"/>
+          </a:xfrm>
+          <a:prstGeom prst="rect">
+            <a:avLst/>
+          </a:prstGeom>
+          <a:noFill/>
+        </p:spPr>
+        <p:txBody>
+          <a:bodyPr wrap="square" rtlCol="0">
+            <a:spAutoFit/>
+          </a:bodyPr>
+          <a:lstStyle/>
+          <a:p>
+            <a:r>
+              <a:rPr lang="tr-TR" dirty="0" smtClean="0"/>
+              <a:t>Top Switch</a:t>
+            </a:r>
+            <a:endParaRPr lang="tr-TR" dirty="0"/>
+          </a:p>
+        </p:txBody>
+      </p:sp>
+      <p:sp>
+        <p:nvSpPr>
+          <p:cNvPr id="10" name="TextBox 9"/>
+          <p:cNvSpPr txBox="1"/>
+          <p:nvPr/>
+        </p:nvSpPr>
+        <p:spPr>
+          <a:xfrm>
+            <a:off x="2676525" y="2343150"/>
+            <a:ext cx="2247900" cy="830997"/>
+          </a:xfrm>
+          <a:prstGeom prst="rect">
+            <a:avLst/>
+          </a:prstGeom>
+          <a:noFill/>
+        </p:spPr>
+        <p:txBody>
+          <a:bodyPr wrap="square" rtlCol="0">
+            <a:spAutoFit/>
+          </a:bodyPr>
+          <a:lstStyle/>
+          <a:p>
+            <a:r>
+              <a:rPr lang="tr-TR" sz="2400" dirty="0" smtClean="0"/>
+              <a:t>Power Loss</a:t>
+            </a:r>
+            <a:br>
+              <a:rPr lang="tr-TR" sz="2400" dirty="0" smtClean="0"/>
+            </a:br>
+            <a:r>
+              <a:rPr lang="tr-TR" sz="2400" b="1" dirty="0" smtClean="0"/>
+              <a:t>2.2542 W</a:t>
+            </a:r>
+            <a:endParaRPr lang="tr-TR" sz="2400" b="1" dirty="0"/>
+          </a:p>
+        </p:txBody>
+      </p:sp>
+      <p:sp>
+        <p:nvSpPr>
+          <p:cNvPr id="13" name="TextBox 12"/>
+          <p:cNvSpPr txBox="1"/>
+          <p:nvPr/>
+        </p:nvSpPr>
+        <p:spPr>
+          <a:xfrm>
+            <a:off x="8277225" y="1149350"/>
+            <a:ext cx="1943100" cy="369332"/>
+          </a:xfrm>
+          <a:prstGeom prst="rect">
+            <a:avLst/>
+          </a:prstGeom>
+          <a:noFill/>
+        </p:spPr>
+        <p:txBody>
+          <a:bodyPr wrap="square" rtlCol="0">
+            <a:spAutoFit/>
+          </a:bodyPr>
+          <a:lstStyle/>
+          <a:p>
+            <a:r>
+              <a:rPr lang="tr-TR" dirty="0" smtClean="0"/>
+              <a:t>Bottom Switch</a:t>
+            </a:r>
+            <a:endParaRPr lang="tr-TR" dirty="0"/>
+          </a:p>
+        </p:txBody>
+      </p:sp>
+      <p:sp>
+        <p:nvSpPr>
+          <p:cNvPr id="14" name="TextBox 13"/>
+          <p:cNvSpPr txBox="1"/>
+          <p:nvPr/>
+        </p:nvSpPr>
+        <p:spPr>
+          <a:xfrm>
+            <a:off x="9234488" y="2343150"/>
+            <a:ext cx="2247900" cy="830997"/>
+          </a:xfrm>
+          <a:prstGeom prst="rect">
+            <a:avLst/>
+          </a:prstGeom>
+          <a:noFill/>
+        </p:spPr>
+        <p:txBody>
+          <a:bodyPr wrap="square" rtlCol="0">
+            <a:spAutoFit/>
+          </a:bodyPr>
+          <a:lstStyle/>
+          <a:p>
+            <a:r>
+              <a:rPr lang="tr-TR" sz="2400" dirty="0" smtClean="0"/>
+              <a:t>Power Loss</a:t>
+            </a:r>
+            <a:br>
+              <a:rPr lang="tr-TR" sz="2400" dirty="0" smtClean="0"/>
+            </a:br>
+            <a:r>
+              <a:rPr lang="tr-TR" sz="2400" b="1" dirty="0" smtClean="0"/>
+              <a:t>0.979 W</a:t>
+            </a:r>
+            <a:endParaRPr lang="tr-TR" sz="2400" b="1" dirty="0"/>
+          </a:p>
+        </p:txBody>
+      </p:sp>
+      <p:sp>
+        <p:nvSpPr>
+          <p:cNvPr id="15" name="TextBox 14"/>
+          <p:cNvSpPr txBox="1"/>
+          <p:nvPr/>
+        </p:nvSpPr>
+        <p:spPr>
+          <a:xfrm>
+            <a:off x="3433763" y="6198255"/>
+            <a:ext cx="5695950" cy="523220"/>
+          </a:xfrm>
+          <a:prstGeom prst="rect">
+            <a:avLst/>
+          </a:prstGeom>
+          <a:noFill/>
+        </p:spPr>
+        <p:txBody>
+          <a:bodyPr wrap="square" rtlCol="0">
+            <a:spAutoFit/>
+          </a:bodyPr>
+          <a:lstStyle/>
+          <a:p>
+            <a:r>
+              <a:rPr lang="tr-TR" sz="2800" b="1" dirty="0" smtClean="0"/>
+              <a:t>Total Transistor Loss = 12.9328 W</a:t>
+            </a:r>
+            <a:endParaRPr lang="tr-TR" sz="2800" b="1" dirty="0"/>
+          </a:p>
+        </p:txBody>
+      </p:sp>
+      <p:sp>
+        <p:nvSpPr>
+          <p:cNvPr id="16" name="TextBox 15"/>
+          <p:cNvSpPr txBox="1"/>
+          <p:nvPr/>
+        </p:nvSpPr>
+        <p:spPr>
+          <a:xfrm>
+            <a:off x="8177213" y="455021"/>
+            <a:ext cx="2114550" cy="461665"/>
+          </a:xfrm>
+          <a:prstGeom prst="rect">
+            <a:avLst/>
+          </a:prstGeom>
+          <a:noFill/>
+        </p:spPr>
+        <p:txBody>
+          <a:bodyPr wrap="square" rtlCol="0">
+            <a:spAutoFit/>
+          </a:bodyPr>
+          <a:lstStyle/>
+          <a:p>
+            <a:r>
+              <a:rPr lang="tr-TR" sz="2400" b="1" dirty="0" smtClean="0"/>
+              <a:t>80 App Ripple</a:t>
+            </a:r>
+            <a:endParaRPr lang="tr-TR" sz="2400" b="1" dirty="0"/>
+          </a:p>
+        </p:txBody>
+      </p:sp>
+      <p:sp>
+        <p:nvSpPr>
+          <p:cNvPr id="11" name="TextBox 10"/>
+          <p:cNvSpPr txBox="1"/>
+          <p:nvPr/>
+        </p:nvSpPr>
+        <p:spPr>
+          <a:xfrm>
+            <a:off x="8515349" y="6198255"/>
+            <a:ext cx="857251" cy="523220"/>
+          </a:xfrm>
+          <a:prstGeom prst="rect">
+            <a:avLst/>
+          </a:prstGeom>
+          <a:noFill/>
+        </p:spPr>
+        <p:txBody>
+          <a:bodyPr wrap="square" rtlCol="0">
+            <a:spAutoFit/>
+          </a:bodyPr>
+          <a:lstStyle/>
+          <a:p>
+            <a:r>
+              <a:rPr lang="tr-TR" sz="2800" b="1" dirty="0" smtClean="0">
+                <a:solidFill>
+                  <a:srgbClr val="00B050"/>
+                </a:solidFill>
+              </a:rPr>
+              <a:t>%57 </a:t>
+            </a:r>
+            <a:endParaRPr lang="tr-TR" sz="2800" b="1" dirty="0">
+              <a:solidFill>
+                <a:srgbClr val="00B050"/>
+              </a:solidFill>
+            </a:endParaRPr>
+          </a:p>
+        </p:txBody>
+      </p:sp>
+      <p:sp>
+        <p:nvSpPr>
+          <p:cNvPr id="17" name="Down Arrow 16"/>
+          <p:cNvSpPr/>
+          <p:nvPr/>
+        </p:nvSpPr>
+        <p:spPr>
+          <a:xfrm>
+            <a:off x="9248775" y="6267450"/>
+            <a:ext cx="276225" cy="454025"/>
+          </a:xfrm>
+          <a:prstGeom prst="downArrow">
+            <a:avLst/>
+          </a:prstGeom>
+          <a:solidFill>
+            <a:srgbClr val="00B050"/>
+          </a:solidFill>
+          <a:ln>
+            <a:solidFill>
+              <a:srgbClr val="00B050"/>
+            </a:solidFill>
+          </a:ln>
+        </p:spPr>
+        <p:style>
+          <a:lnRef idx="2">
+            <a:schemeClr val="accent1">
+              <a:shade val="50000"/>
+            </a:schemeClr>
+          </a:lnRef>
+          <a:fillRef idx="1">
+            <a:schemeClr val="accent1"/>
+          </a:fillRef>
+          <a:effectRef idx="0">
+            <a:schemeClr val="accent1"/>
+          </a:effectRef>
+          <a:fontRef idx="minor">
+            <a:schemeClr val="lt1"/>
+          </a:fontRef>
+        </p:style>
+        <p:txBody>
+          <a:bodyPr rtlCol="0" anchor="ctr"/>
+          <a:lstStyle/>
+          <a:p>
+            <a:pPr algn="ctr"/>
+            <a:endParaRPr lang="tr-TR"/>
+          </a:p>
+        </p:txBody>
+      </p:sp>
+    </p:spTree>
+    <p:extLst>
+      <p:ext uri="{BB962C8B-B14F-4D97-AF65-F5344CB8AC3E}">
+        <p14:creationId xmlns:p14="http://schemas.microsoft.com/office/powerpoint/2010/main" val="2605054966"/>
+      </p:ext>
+    </p:extLst>
+  </p:cSld>
+  <p:clrMapOvr>
+    <a:masterClrMapping/>
+  </p:clrMapOvr>
+</p:sld>
+</file>
+
+<file path=ppt/slides/slide11.xml><?xml version="1.0" encoding="utf-8"?>
+<p:sld xmlns:a="http://schemas.openxmlformats.org/drawingml/2006/main" xmlns:r="http://schemas.openxmlformats.org/officeDocument/2006/relationships" xmlns:p="http://schemas.openxmlformats.org/presentationml/2006/main">
+  <p:cSld>
+    <p:spTree>
+      <p:nvGrpSpPr>
+        <p:cNvPr id="1" name=""/>
+        <p:cNvGrpSpPr/>
+        <p:nvPr/>
+      </p:nvGrpSpPr>
+      <p:grpSpPr>
+        <a:xfrm>
+          <a:off x="0" y="0"/>
+          <a:ext cx="0" cy="0"/>
+          <a:chOff x="0" y="0"/>
+          <a:chExt cx="0" cy="0"/>
+        </a:xfrm>
+      </p:grpSpPr>
+      <p:pic>
+        <p:nvPicPr>
+          <p:cNvPr id="6" name="Picture 5"/>
+          <p:cNvPicPr>
+            <a:picLocks noChangeAspect="1"/>
+          </p:cNvPicPr>
+          <p:nvPr/>
+        </p:nvPicPr>
+        <p:blipFill>
+          <a:blip r:embed="rId2"/>
+          <a:stretch>
+            <a:fillRect/>
+          </a:stretch>
+        </p:blipFill>
+        <p:spPr>
+          <a:xfrm>
+            <a:off x="376237" y="1608537"/>
+            <a:ext cx="5133975" cy="4267200"/>
+          </a:xfrm>
+          <a:prstGeom prst="rect">
+            <a:avLst/>
+          </a:prstGeom>
+        </p:spPr>
+      </p:pic>
+      <p:pic>
+        <p:nvPicPr>
+          <p:cNvPr id="3" name="Picture 2"/>
+          <p:cNvPicPr>
+            <a:picLocks noChangeAspect="1"/>
+          </p:cNvPicPr>
+          <p:nvPr/>
+        </p:nvPicPr>
+        <p:blipFill>
+          <a:blip r:embed="rId3"/>
+          <a:stretch>
+            <a:fillRect/>
+          </a:stretch>
+        </p:blipFill>
+        <p:spPr>
+          <a:xfrm>
+            <a:off x="6376986" y="1608537"/>
+            <a:ext cx="5133975" cy="4267200"/>
+          </a:xfrm>
+          <a:prstGeom prst="rect">
+            <a:avLst/>
+          </a:prstGeom>
+        </p:spPr>
+      </p:pic>
+      <p:sp>
+        <p:nvSpPr>
+          <p:cNvPr id="4" name="Slide Number Placeholder 3"/>
+          <p:cNvSpPr>
+            <a:spLocks noGrp="1"/>
+          </p:cNvSpPr>
+          <p:nvPr>
+            <p:ph type="sldNum" sz="quarter" idx="12"/>
+          </p:nvPr>
+        </p:nvSpPr>
+        <p:spPr/>
+        <p:txBody>
+          <a:bodyPr/>
+          <a:lstStyle/>
+          <a:p>
+            <a:fld id="{178508F5-8E49-4F57-B165-331DE2AB85B8}" type="slidenum">
+              <a:rPr lang="tr-TR" sz="1800" smtClean="0"/>
+              <a:t>11</a:t>
+            </a:fld>
+            <a:endParaRPr lang="tr-TR" dirty="0"/>
+          </a:p>
+        </p:txBody>
+      </p:sp>
+      <p:sp>
+        <p:nvSpPr>
+          <p:cNvPr id="5" name="TextBox 4"/>
+          <p:cNvSpPr txBox="1"/>
+          <p:nvPr/>
+        </p:nvSpPr>
+        <p:spPr>
+          <a:xfrm>
+            <a:off x="562707" y="316523"/>
+            <a:ext cx="2558562" cy="461665"/>
+          </a:xfrm>
+          <a:prstGeom prst="rect">
+            <a:avLst/>
+          </a:prstGeom>
+          <a:noFill/>
+        </p:spPr>
+        <p:txBody>
+          <a:bodyPr wrap="square" rtlCol="0">
+            <a:spAutoFit/>
+          </a:bodyPr>
+          <a:lstStyle/>
+          <a:p>
+            <a:r>
+              <a:rPr lang="tr-TR" sz="2400" dirty="0" smtClean="0"/>
+              <a:t>Simulation Study</a:t>
+            </a:r>
+            <a:endParaRPr lang="tr-TR" sz="2400" dirty="0"/>
+          </a:p>
+        </p:txBody>
+      </p:sp>
+      <p:sp>
+        <p:nvSpPr>
+          <p:cNvPr id="2" name="TextBox 1"/>
+          <p:cNvSpPr txBox="1"/>
+          <p:nvPr/>
+        </p:nvSpPr>
+        <p:spPr>
+          <a:xfrm>
+            <a:off x="3800475" y="85690"/>
+            <a:ext cx="3419475" cy="1200329"/>
+          </a:xfrm>
+          <a:prstGeom prst="rect">
+            <a:avLst/>
+          </a:prstGeom>
+          <a:noFill/>
+        </p:spPr>
+        <p:txBody>
+          <a:bodyPr wrap="square" rtlCol="0">
+            <a:spAutoFit/>
+          </a:bodyPr>
+          <a:lstStyle/>
+          <a:p>
+            <a:r>
+              <a:rPr lang="tr-TR" dirty="0" smtClean="0"/>
+              <a:t>K = 4 -&gt; Synch. switch</a:t>
+            </a:r>
+            <a:r>
+              <a:rPr lang="tr-TR" b="1" dirty="0" smtClean="0"/>
+              <a:t/>
+            </a:r>
+            <a:br>
+              <a:rPr lang="tr-TR" b="1" dirty="0" smtClean="0"/>
+            </a:br>
+            <a:r>
+              <a:rPr lang="tr-TR" dirty="0" smtClean="0"/>
+              <a:t>Vin = 540V</a:t>
+            </a:r>
+          </a:p>
+          <a:p>
+            <a:r>
+              <a:rPr lang="tr-TR" dirty="0" smtClean="0"/>
+              <a:t>Vout </a:t>
+            </a:r>
+            <a:r>
+              <a:rPr lang="tr-TR" dirty="0"/>
+              <a:t>= </a:t>
+            </a:r>
+            <a:r>
+              <a:rPr lang="tr-TR" dirty="0" smtClean="0"/>
+              <a:t>400V, Pout = 8 kW </a:t>
+            </a:r>
+          </a:p>
+          <a:p>
+            <a:r>
+              <a:rPr lang="tr-TR" dirty="0"/>
+              <a:t>fsw = 100 </a:t>
+            </a:r>
+            <a:r>
+              <a:rPr lang="tr-TR" dirty="0" smtClean="0"/>
+              <a:t>kHz, </a:t>
+            </a:r>
+            <a:r>
+              <a:rPr lang="tr-TR" b="1" dirty="0" smtClean="0"/>
+              <a:t>Tj = 125˚C</a:t>
+            </a:r>
+            <a:endParaRPr lang="tr-TR" b="1" dirty="0"/>
+          </a:p>
+        </p:txBody>
+      </p:sp>
+      <p:sp>
+        <p:nvSpPr>
+          <p:cNvPr id="9" name="TextBox 8"/>
+          <p:cNvSpPr txBox="1"/>
+          <p:nvPr/>
+        </p:nvSpPr>
+        <p:spPr>
+          <a:xfrm>
+            <a:off x="2324100" y="1126093"/>
+            <a:ext cx="1943100" cy="369332"/>
+          </a:xfrm>
+          <a:prstGeom prst="rect">
+            <a:avLst/>
+          </a:prstGeom>
+          <a:noFill/>
+        </p:spPr>
+        <p:txBody>
+          <a:bodyPr wrap="square" rtlCol="0">
+            <a:spAutoFit/>
+          </a:bodyPr>
+          <a:lstStyle/>
+          <a:p>
+            <a:r>
+              <a:rPr lang="tr-TR" dirty="0" smtClean="0"/>
+              <a:t>Top Switch</a:t>
+            </a:r>
+            <a:endParaRPr lang="tr-TR" dirty="0"/>
+          </a:p>
+        </p:txBody>
+      </p:sp>
+      <p:sp>
+        <p:nvSpPr>
+          <p:cNvPr id="10" name="TextBox 9"/>
+          <p:cNvSpPr txBox="1"/>
+          <p:nvPr/>
+        </p:nvSpPr>
+        <p:spPr>
+          <a:xfrm>
+            <a:off x="2676525" y="2343150"/>
+            <a:ext cx="2247900" cy="830997"/>
+          </a:xfrm>
+          <a:prstGeom prst="rect">
+            <a:avLst/>
+          </a:prstGeom>
+          <a:noFill/>
+        </p:spPr>
+        <p:txBody>
+          <a:bodyPr wrap="square" rtlCol="0">
+            <a:spAutoFit/>
+          </a:bodyPr>
+          <a:lstStyle/>
+          <a:p>
+            <a:r>
+              <a:rPr lang="tr-TR" sz="2400" dirty="0" smtClean="0"/>
+              <a:t>Power Loss</a:t>
+            </a:r>
+            <a:br>
+              <a:rPr lang="tr-TR" sz="2400" dirty="0" smtClean="0"/>
+            </a:br>
+            <a:r>
+              <a:rPr lang="tr-TR" sz="2400" b="1" dirty="0" smtClean="0"/>
+              <a:t>5.3075 W</a:t>
+            </a:r>
+            <a:endParaRPr lang="tr-TR" sz="2400" b="1" dirty="0"/>
+          </a:p>
+        </p:txBody>
+      </p:sp>
+      <p:sp>
+        <p:nvSpPr>
+          <p:cNvPr id="13" name="TextBox 12"/>
+          <p:cNvSpPr txBox="1"/>
+          <p:nvPr/>
+        </p:nvSpPr>
+        <p:spPr>
+          <a:xfrm>
+            <a:off x="8277225" y="1149350"/>
+            <a:ext cx="1943100" cy="369332"/>
+          </a:xfrm>
+          <a:prstGeom prst="rect">
+            <a:avLst/>
+          </a:prstGeom>
+          <a:noFill/>
+        </p:spPr>
+        <p:txBody>
+          <a:bodyPr wrap="square" rtlCol="0">
+            <a:spAutoFit/>
+          </a:bodyPr>
+          <a:lstStyle/>
+          <a:p>
+            <a:r>
+              <a:rPr lang="tr-TR" dirty="0" smtClean="0"/>
+              <a:t>Bottom Switch</a:t>
+            </a:r>
+            <a:endParaRPr lang="tr-TR" dirty="0"/>
+          </a:p>
+        </p:txBody>
+      </p:sp>
+      <p:sp>
+        <p:nvSpPr>
+          <p:cNvPr id="14" name="TextBox 13"/>
+          <p:cNvSpPr txBox="1"/>
+          <p:nvPr/>
+        </p:nvSpPr>
+        <p:spPr>
+          <a:xfrm>
+            <a:off x="9234488" y="2343150"/>
+            <a:ext cx="2247900" cy="830997"/>
+          </a:xfrm>
+          <a:prstGeom prst="rect">
+            <a:avLst/>
+          </a:prstGeom>
+          <a:noFill/>
+        </p:spPr>
+        <p:txBody>
+          <a:bodyPr wrap="square" rtlCol="0">
+            <a:spAutoFit/>
+          </a:bodyPr>
+          <a:lstStyle/>
+          <a:p>
+            <a:r>
+              <a:rPr lang="tr-TR" sz="2400" dirty="0" smtClean="0"/>
+              <a:t>Power Loss</a:t>
+            </a:r>
+            <a:br>
+              <a:rPr lang="tr-TR" sz="2400" dirty="0" smtClean="0"/>
+            </a:br>
+            <a:r>
+              <a:rPr lang="tr-TR" sz="2400" b="1" dirty="0" smtClean="0"/>
+              <a:t>2.1791 W</a:t>
+            </a:r>
+            <a:endParaRPr lang="tr-TR" sz="2400" b="1" dirty="0"/>
+          </a:p>
+        </p:txBody>
+      </p:sp>
+      <p:sp>
+        <p:nvSpPr>
+          <p:cNvPr id="15" name="TextBox 14"/>
+          <p:cNvSpPr txBox="1"/>
+          <p:nvPr/>
+        </p:nvSpPr>
+        <p:spPr>
+          <a:xfrm>
+            <a:off x="3433763" y="6198255"/>
+            <a:ext cx="5695950" cy="523220"/>
+          </a:xfrm>
+          <a:prstGeom prst="rect">
+            <a:avLst/>
+          </a:prstGeom>
+          <a:noFill/>
+        </p:spPr>
+        <p:txBody>
+          <a:bodyPr wrap="square" rtlCol="0">
+            <a:spAutoFit/>
+          </a:bodyPr>
+          <a:lstStyle/>
+          <a:p>
+            <a:r>
+              <a:rPr lang="tr-TR" sz="2800" b="1" dirty="0" smtClean="0"/>
+              <a:t>Total Transistor Loss = 29.9464 W</a:t>
+            </a:r>
+            <a:endParaRPr lang="tr-TR" sz="2800" b="1" dirty="0"/>
+          </a:p>
+        </p:txBody>
+      </p:sp>
+      <p:sp>
+        <p:nvSpPr>
+          <p:cNvPr id="16" name="TextBox 15"/>
+          <p:cNvSpPr txBox="1"/>
+          <p:nvPr/>
+        </p:nvSpPr>
+        <p:spPr>
+          <a:xfrm>
+            <a:off x="8177213" y="455021"/>
+            <a:ext cx="2114550" cy="461665"/>
+          </a:xfrm>
+          <a:prstGeom prst="rect">
+            <a:avLst/>
+          </a:prstGeom>
+          <a:noFill/>
+        </p:spPr>
+        <p:txBody>
+          <a:bodyPr wrap="square" rtlCol="0">
+            <a:spAutoFit/>
+          </a:bodyPr>
+          <a:lstStyle/>
+          <a:p>
+            <a:r>
+              <a:rPr lang="tr-TR" sz="2400" b="1" dirty="0" smtClean="0"/>
+              <a:t>80 App Ripple</a:t>
+            </a:r>
+            <a:endParaRPr lang="tr-TR" sz="2400" b="1" dirty="0"/>
+          </a:p>
+        </p:txBody>
+      </p:sp>
+      <p:sp>
+        <p:nvSpPr>
+          <p:cNvPr id="11" name="TextBox 10"/>
+          <p:cNvSpPr txBox="1"/>
+          <p:nvPr/>
+        </p:nvSpPr>
+        <p:spPr>
+          <a:xfrm>
+            <a:off x="8515349" y="6198255"/>
+            <a:ext cx="857251" cy="523220"/>
+          </a:xfrm>
+          <a:prstGeom prst="rect">
+            <a:avLst/>
+          </a:prstGeom>
+          <a:noFill/>
+        </p:spPr>
+        <p:txBody>
+          <a:bodyPr wrap="square" rtlCol="0">
+            <a:spAutoFit/>
+          </a:bodyPr>
+          <a:lstStyle/>
+          <a:p>
+            <a:r>
+              <a:rPr lang="tr-TR" sz="2800" b="1" dirty="0" smtClean="0">
+                <a:solidFill>
+                  <a:srgbClr val="00B050"/>
+                </a:solidFill>
+              </a:rPr>
+              <a:t>%37 </a:t>
+            </a:r>
+            <a:endParaRPr lang="tr-TR" sz="2800" b="1" dirty="0">
+              <a:solidFill>
+                <a:srgbClr val="00B050"/>
+              </a:solidFill>
+            </a:endParaRPr>
+          </a:p>
+        </p:txBody>
+      </p:sp>
+      <p:sp>
+        <p:nvSpPr>
+          <p:cNvPr id="17" name="Down Arrow 16"/>
+          <p:cNvSpPr/>
+          <p:nvPr/>
+        </p:nvSpPr>
+        <p:spPr>
+          <a:xfrm>
+            <a:off x="9248775" y="6267450"/>
+            <a:ext cx="276225" cy="454025"/>
+          </a:xfrm>
+          <a:prstGeom prst="downArrow">
+            <a:avLst/>
+          </a:prstGeom>
+          <a:solidFill>
+            <a:srgbClr val="00B050"/>
+          </a:solidFill>
+          <a:ln>
+            <a:solidFill>
+              <a:srgbClr val="00B050"/>
+            </a:solidFill>
+          </a:ln>
+        </p:spPr>
+        <p:style>
+          <a:lnRef idx="2">
+            <a:schemeClr val="accent1">
+              <a:shade val="50000"/>
+            </a:schemeClr>
+          </a:lnRef>
+          <a:fillRef idx="1">
+            <a:schemeClr val="accent1"/>
+          </a:fillRef>
+          <a:effectRef idx="0">
+            <a:schemeClr val="accent1"/>
+          </a:effectRef>
+          <a:fontRef idx="minor">
+            <a:schemeClr val="lt1"/>
+          </a:fontRef>
+        </p:style>
+        <p:txBody>
+          <a:bodyPr rtlCol="0" anchor="ctr"/>
+          <a:lstStyle/>
+          <a:p>
+            <a:pPr algn="ctr"/>
+            <a:endParaRPr lang="tr-TR"/>
+          </a:p>
+        </p:txBody>
+      </p:sp>
+    </p:spTree>
+    <p:extLst>
+      <p:ext uri="{BB962C8B-B14F-4D97-AF65-F5344CB8AC3E}">
+        <p14:creationId xmlns:p14="http://schemas.microsoft.com/office/powerpoint/2010/main" val="637327411"/>
+      </p:ext>
+    </p:extLst>
+  </p:cSld>
+  <p:clrMapOvr>
+    <a:masterClrMapping/>
+  </p:clrMapOvr>
+</p:sld>
+</file>
+
+<file path=ppt/slides/slide12.xml><?xml version="1.0" encoding="utf-8"?>
+<p:sld xmlns:a="http://schemas.openxmlformats.org/drawingml/2006/main" xmlns:r="http://schemas.openxmlformats.org/officeDocument/2006/relationships" xmlns:p="http://schemas.openxmlformats.org/presentationml/2006/main">
+  <p:cSld>
+    <p:spTree>
+      <p:nvGrpSpPr>
+        <p:cNvPr id="1" name=""/>
+        <p:cNvGrpSpPr/>
+        <p:nvPr/>
+      </p:nvGrpSpPr>
+      <p:grpSpPr>
+        <a:xfrm>
+          <a:off x="0" y="0"/>
+          <a:ext cx="0" cy="0"/>
+          <a:chOff x="0" y="0"/>
+          <a:chExt cx="0" cy="0"/>
+        </a:xfrm>
+      </p:grpSpPr>
+      <p:sp>
+        <p:nvSpPr>
+          <p:cNvPr id="4" name="Slide Number Placeholder 3"/>
+          <p:cNvSpPr>
+            <a:spLocks noGrp="1"/>
+          </p:cNvSpPr>
+          <p:nvPr>
+            <p:ph type="sldNum" sz="quarter" idx="12"/>
+          </p:nvPr>
+        </p:nvSpPr>
+        <p:spPr/>
+        <p:txBody>
+          <a:bodyPr/>
+          <a:lstStyle/>
+          <a:p>
+            <a:fld id="{178508F5-8E49-4F57-B165-331DE2AB85B8}" type="slidenum">
+              <a:rPr lang="tr-TR" sz="1800" smtClean="0"/>
+              <a:t>12</a:t>
+            </a:fld>
+            <a:endParaRPr lang="tr-TR" sz="1800" dirty="0"/>
+          </a:p>
+        </p:txBody>
+      </p:sp>
+      <p:sp>
+        <p:nvSpPr>
+          <p:cNvPr id="5" name="TextBox 4"/>
+          <p:cNvSpPr txBox="1"/>
+          <p:nvPr/>
+        </p:nvSpPr>
+        <p:spPr>
+          <a:xfrm>
+            <a:off x="562707" y="316523"/>
+            <a:ext cx="2558562" cy="461665"/>
+          </a:xfrm>
+          <a:prstGeom prst="rect">
+            <a:avLst/>
+          </a:prstGeom>
+          <a:noFill/>
+        </p:spPr>
+        <p:txBody>
+          <a:bodyPr wrap="square" rtlCol="0">
+            <a:spAutoFit/>
+          </a:bodyPr>
+          <a:lstStyle/>
+          <a:p>
+            <a:r>
+              <a:rPr lang="tr-TR" sz="2400" dirty="0" smtClean="0"/>
+              <a:t>Simulation Study</a:t>
+            </a:r>
+            <a:endParaRPr lang="tr-TR" sz="2400" dirty="0"/>
+          </a:p>
+        </p:txBody>
+      </p:sp>
+      <p:pic>
+        <p:nvPicPr>
+          <p:cNvPr id="2" name="Picture 1"/>
+          <p:cNvPicPr>
+            <a:picLocks noChangeAspect="1"/>
+          </p:cNvPicPr>
+          <p:nvPr/>
+        </p:nvPicPr>
+        <p:blipFill>
+          <a:blip r:embed="rId2"/>
+          <a:stretch>
+            <a:fillRect/>
+          </a:stretch>
+        </p:blipFill>
+        <p:spPr>
+          <a:xfrm>
+            <a:off x="562707" y="1077413"/>
+            <a:ext cx="9915525" cy="5278937"/>
+          </a:xfrm>
+          <a:prstGeom prst="rect">
+            <a:avLst/>
+          </a:prstGeom>
+        </p:spPr>
+      </p:pic>
+      <p:cxnSp>
+        <p:nvCxnSpPr>
+          <p:cNvPr id="6" name="Straight Arrow Connector 5"/>
+          <p:cNvCxnSpPr/>
+          <p:nvPr/>
+        </p:nvCxnSpPr>
+        <p:spPr>
+          <a:xfrm flipV="1">
+            <a:off x="2206869" y="2242038"/>
+            <a:ext cx="773723" cy="2514600"/>
+          </a:xfrm>
+          <a:prstGeom prst="straightConnector1">
+            <a:avLst/>
+          </a:prstGeom>
+          <a:ln w="57150">
+            <a:solidFill>
+              <a:srgbClr val="00B050"/>
+            </a:solidFill>
+            <a:tailEnd type="triangle"/>
+          </a:ln>
+        </p:spPr>
+        <p:style>
+          <a:lnRef idx="1">
+            <a:schemeClr val="accent1"/>
+          </a:lnRef>
+          <a:fillRef idx="0">
+            <a:schemeClr val="accent1"/>
+          </a:fillRef>
+          <a:effectRef idx="0">
+            <a:schemeClr val="accent1"/>
+          </a:effectRef>
+          <a:fontRef idx="minor">
+            <a:schemeClr val="tx1"/>
+          </a:fontRef>
+        </p:style>
+      </p:cxnSp>
+      <p:cxnSp>
+        <p:nvCxnSpPr>
+          <p:cNvPr id="8" name="Straight Arrow Connector 7"/>
+          <p:cNvCxnSpPr/>
+          <p:nvPr/>
+        </p:nvCxnSpPr>
+        <p:spPr>
+          <a:xfrm flipH="1" flipV="1">
+            <a:off x="3508862" y="2242038"/>
+            <a:ext cx="802302" cy="2514600"/>
+          </a:xfrm>
+          <a:prstGeom prst="straightConnector1">
+            <a:avLst/>
+          </a:prstGeom>
+          <a:ln w="57150">
+            <a:solidFill>
+              <a:srgbClr val="00B050"/>
+            </a:solidFill>
+            <a:tailEnd type="triangle"/>
+          </a:ln>
+        </p:spPr>
+        <p:style>
+          <a:lnRef idx="1">
+            <a:schemeClr val="accent1"/>
+          </a:lnRef>
+          <a:fillRef idx="0">
+            <a:schemeClr val="accent1"/>
+          </a:fillRef>
+          <a:effectRef idx="0">
+            <a:schemeClr val="accent1"/>
+          </a:effectRef>
+          <a:fontRef idx="minor">
+            <a:schemeClr val="tx1"/>
+          </a:fontRef>
+        </p:style>
+      </p:cxnSp>
+      <p:sp>
+        <p:nvSpPr>
+          <p:cNvPr id="11" name="TextBox 10"/>
+          <p:cNvSpPr txBox="1"/>
+          <p:nvPr/>
+        </p:nvSpPr>
+        <p:spPr>
+          <a:xfrm>
+            <a:off x="1841988" y="1595707"/>
+            <a:ext cx="2954216" cy="646331"/>
+          </a:xfrm>
+          <a:prstGeom prst="rect">
+            <a:avLst/>
+          </a:prstGeom>
+          <a:noFill/>
+        </p:spPr>
+        <p:txBody>
+          <a:bodyPr wrap="square" rtlCol="0">
+            <a:spAutoFit/>
+          </a:bodyPr>
+          <a:lstStyle/>
+          <a:p>
+            <a:pPr algn="ctr"/>
+            <a:r>
+              <a:rPr lang="tr-TR" b="1" dirty="0" smtClean="0"/>
+              <a:t>Seperated Switching Nodes for Interleaving</a:t>
+            </a:r>
+            <a:endParaRPr lang="tr-TR" b="1" dirty="0"/>
+          </a:p>
+        </p:txBody>
+      </p:sp>
+    </p:spTree>
+    <p:extLst>
+      <p:ext uri="{BB962C8B-B14F-4D97-AF65-F5344CB8AC3E}">
+        <p14:creationId xmlns:p14="http://schemas.microsoft.com/office/powerpoint/2010/main" val="1722078275"/>
+      </p:ext>
+    </p:extLst>
+  </p:cSld>
+  <p:clrMapOvr>
+    <a:masterClrMapping/>
+  </p:clrMapOvr>
+</p:sld>
+</file>
+
+<file path=ppt/slides/slide13.xml><?xml version="1.0" encoding="utf-8"?>
+<p:sld xmlns:a="http://schemas.openxmlformats.org/drawingml/2006/main" xmlns:r="http://schemas.openxmlformats.org/officeDocument/2006/relationships" xmlns:p="http://schemas.openxmlformats.org/presentationml/2006/main">
+  <p:cSld>
+    <p:spTree>
+      <p:nvGrpSpPr>
+        <p:cNvPr id="1" name=""/>
+        <p:cNvGrpSpPr/>
+        <p:nvPr/>
+      </p:nvGrpSpPr>
+      <p:grpSpPr>
+        <a:xfrm>
+          <a:off x="0" y="0"/>
+          <a:ext cx="0" cy="0"/>
+          <a:chOff x="0" y="0"/>
+          <a:chExt cx="0" cy="0"/>
+        </a:xfrm>
+      </p:grpSpPr>
+      <p:sp>
+        <p:nvSpPr>
+          <p:cNvPr id="4" name="Slide Number Placeholder 3"/>
+          <p:cNvSpPr>
+            <a:spLocks noGrp="1"/>
+          </p:cNvSpPr>
+          <p:nvPr>
+            <p:ph type="sldNum" sz="quarter" idx="12"/>
+          </p:nvPr>
+        </p:nvSpPr>
+        <p:spPr/>
+        <p:txBody>
+          <a:bodyPr/>
+          <a:lstStyle/>
+          <a:p>
+            <a:fld id="{178508F5-8E49-4F57-B165-331DE2AB85B8}" type="slidenum">
+              <a:rPr lang="tr-TR" sz="1800" smtClean="0"/>
+              <a:t>13</a:t>
+            </a:fld>
+            <a:endParaRPr lang="tr-TR" sz="1800" dirty="0"/>
+          </a:p>
+        </p:txBody>
+      </p:sp>
+      <p:sp>
+        <p:nvSpPr>
+          <p:cNvPr id="5" name="TextBox 4"/>
+          <p:cNvSpPr txBox="1"/>
+          <p:nvPr/>
+        </p:nvSpPr>
+        <p:spPr>
+          <a:xfrm>
+            <a:off x="562707" y="316523"/>
+            <a:ext cx="2558562" cy="461665"/>
+          </a:xfrm>
+          <a:prstGeom prst="rect">
+            <a:avLst/>
+          </a:prstGeom>
+          <a:noFill/>
+        </p:spPr>
+        <p:txBody>
+          <a:bodyPr wrap="square" rtlCol="0">
+            <a:spAutoFit/>
+          </a:bodyPr>
+          <a:lstStyle/>
+          <a:p>
+            <a:r>
+              <a:rPr lang="tr-TR" sz="2400" dirty="0" smtClean="0"/>
+              <a:t>Simulation Study</a:t>
+            </a:r>
+            <a:endParaRPr lang="tr-TR" sz="2400" dirty="0"/>
+          </a:p>
+        </p:txBody>
+      </p:sp>
+      <p:sp>
+        <p:nvSpPr>
+          <p:cNvPr id="3" name="TextBox 2"/>
+          <p:cNvSpPr txBox="1"/>
+          <p:nvPr/>
+        </p:nvSpPr>
+        <p:spPr>
+          <a:xfrm>
+            <a:off x="562707" y="914400"/>
+            <a:ext cx="8554915" cy="369332"/>
+          </a:xfrm>
+          <a:prstGeom prst="rect">
+            <a:avLst/>
+          </a:prstGeom>
+          <a:noFill/>
+        </p:spPr>
+        <p:txBody>
+          <a:bodyPr wrap="square" rtlCol="0">
+            <a:spAutoFit/>
+          </a:bodyPr>
+          <a:lstStyle/>
+          <a:p>
+            <a:r>
+              <a:rPr lang="tr-TR" b="1" dirty="0" smtClean="0"/>
+              <a:t>Advantages of Interleaved Half-Bridges for ZVRT Switching Buck Converter Application</a:t>
+            </a:r>
+            <a:endParaRPr lang="tr-TR" b="1" dirty="0"/>
+          </a:p>
+        </p:txBody>
+      </p:sp>
+      <p:sp>
+        <p:nvSpPr>
+          <p:cNvPr id="7" name="TextBox 6"/>
+          <p:cNvSpPr txBox="1"/>
+          <p:nvPr/>
+        </p:nvSpPr>
+        <p:spPr>
+          <a:xfrm>
+            <a:off x="685800" y="1441938"/>
+            <a:ext cx="7924800" cy="1477328"/>
+          </a:xfrm>
+          <a:prstGeom prst="rect">
+            <a:avLst/>
+          </a:prstGeom>
+          <a:noFill/>
+        </p:spPr>
+        <p:txBody>
+          <a:bodyPr wrap="square" rtlCol="0">
+            <a:spAutoFit/>
+          </a:bodyPr>
+          <a:lstStyle/>
+          <a:p>
+            <a:pPr marL="285750" indent="-285750">
+              <a:buFont typeface="Arial" panose="020B0604020202020204" pitchFamily="34" charset="0"/>
+              <a:buChar char="•"/>
+            </a:pPr>
+            <a:r>
+              <a:rPr lang="tr-TR" dirty="0" smtClean="0"/>
+              <a:t>The average output current is shared between two inductors which reduces average inductor current</a:t>
+            </a:r>
+          </a:p>
+          <a:p>
+            <a:pPr marL="285750" indent="-285750">
+              <a:buFont typeface="Arial" panose="020B0604020202020204" pitchFamily="34" charset="0"/>
+              <a:buChar char="•"/>
+            </a:pPr>
+            <a:r>
+              <a:rPr lang="tr-TR" dirty="0" smtClean="0"/>
+              <a:t>Having less average inductor current requires less ripple current (K *Iavg)</a:t>
+            </a:r>
+          </a:p>
+          <a:p>
+            <a:pPr marL="285750" indent="-285750">
+              <a:buFont typeface="Arial" panose="020B0604020202020204" pitchFamily="34" charset="0"/>
+              <a:buChar char="•"/>
+            </a:pPr>
+            <a:r>
+              <a:rPr lang="tr-TR" dirty="0" smtClean="0"/>
+              <a:t>Applying 180˚ phase shift between two half-bridges reduces stress over output capacitor significantly</a:t>
+            </a:r>
+            <a:endParaRPr lang="tr-TR" dirty="0"/>
+          </a:p>
+        </p:txBody>
+      </p:sp>
+      <p:sp>
+        <p:nvSpPr>
+          <p:cNvPr id="9" name="TextBox 8"/>
+          <p:cNvSpPr txBox="1"/>
+          <p:nvPr/>
+        </p:nvSpPr>
+        <p:spPr>
+          <a:xfrm>
+            <a:off x="562707" y="3129831"/>
+            <a:ext cx="7781192" cy="369332"/>
+          </a:xfrm>
+          <a:prstGeom prst="rect">
+            <a:avLst/>
+          </a:prstGeom>
+          <a:noFill/>
+        </p:spPr>
+        <p:txBody>
+          <a:bodyPr wrap="square" rtlCol="0">
+            <a:spAutoFit/>
+          </a:bodyPr>
+          <a:lstStyle/>
+          <a:p>
+            <a:r>
+              <a:rPr lang="tr-TR" b="1" dirty="0" smtClean="0"/>
+              <a:t>What we get from interleaving</a:t>
+            </a:r>
+            <a:endParaRPr lang="tr-TR" b="1" dirty="0"/>
+          </a:p>
+        </p:txBody>
+      </p:sp>
+      <mc:AlternateContent xmlns:mc="http://schemas.openxmlformats.org/markup-compatibility/2006">
+        <mc:Choice xmlns:a14="http://schemas.microsoft.com/office/drawing/2010/main" Requires="a14">
+          <p:sp>
+            <p:nvSpPr>
+              <p:cNvPr id="10" name="TextBox 9"/>
+              <p:cNvSpPr txBox="1"/>
+              <p:nvPr/>
+            </p:nvSpPr>
+            <p:spPr>
+              <a:xfrm>
+                <a:off x="1041888" y="3709728"/>
+                <a:ext cx="2844625" cy="335028"/>
+              </a:xfrm>
+              <a:prstGeom prst="rect">
+                <a:avLst/>
+              </a:prstGeom>
+              <a:noFill/>
+            </p:spPr>
+            <p:txBody>
+              <a:bodyPr wrap="none" lIns="0" tIns="0" rIns="0" bIns="0" rtlCol="0">
+                <a:spAutoFit/>
+              </a:bodyPr>
+              <a:lstStyle/>
+              <a:p>
+                <a14:m>
+                  <m:oMathPara xmlns:m="http://schemas.openxmlformats.org/officeDocument/2006/math">
+                    <m:oMathParaPr>
+                      <m:jc m:val="centerGroup"/>
+                    </m:oMathParaPr>
+                    <m:oMath xmlns:m="http://schemas.openxmlformats.org/officeDocument/2006/math">
+                      <m:sSub>
+                        <m:sSubPr>
+                          <m:ctrlPr>
+                            <a:rPr lang="tr-TR" b="0" i="1" smtClean="0">
+                              <a:latin typeface="Cambria Math" panose="02040503050406030204" pitchFamily="18" charset="0"/>
+                            </a:rPr>
+                          </m:ctrlPr>
+                        </m:sSubPr>
+                        <m:e>
+                          <m:r>
+                            <a:rPr lang="tr-TR" b="0" i="1" smtClean="0">
+                              <a:latin typeface="Cambria Math" panose="02040503050406030204" pitchFamily="18" charset="0"/>
+                            </a:rPr>
+                            <m:t>𝐼</m:t>
+                          </m:r>
+                        </m:e>
+                        <m:sub>
+                          <m:sSub>
+                            <m:sSubPr>
+                              <m:ctrlPr>
+                                <a:rPr lang="tr-TR" b="0" i="1" smtClean="0">
+                                  <a:latin typeface="Cambria Math" panose="02040503050406030204" pitchFamily="18" charset="0"/>
+                                </a:rPr>
+                              </m:ctrlPr>
+                            </m:sSubPr>
+                            <m:e>
+                              <m:r>
+                                <a:rPr lang="tr-TR" b="0" i="1" smtClean="0">
+                                  <a:latin typeface="Cambria Math" panose="02040503050406030204" pitchFamily="18" charset="0"/>
+                                </a:rPr>
+                                <m:t>𝐿</m:t>
+                              </m:r>
+                            </m:e>
+                            <m:sub>
+                              <m:r>
+                                <a:rPr lang="tr-TR" b="0" i="1" smtClean="0">
+                                  <a:latin typeface="Cambria Math" panose="02040503050406030204" pitchFamily="18" charset="0"/>
+                                </a:rPr>
+                                <m:t>𝑎𝑣𝑔</m:t>
+                              </m:r>
+                            </m:sub>
+                          </m:sSub>
+                        </m:sub>
+                      </m:sSub>
+                      <m:r>
+                        <a:rPr lang="tr-TR" b="0" i="1" smtClean="0">
+                          <a:latin typeface="Cambria Math" panose="02040503050406030204" pitchFamily="18" charset="0"/>
+                        </a:rPr>
+                        <m:t>=20 </m:t>
+                      </m:r>
+                      <m:r>
+                        <a:rPr lang="tr-TR" b="0" i="1" smtClean="0">
+                          <a:latin typeface="Cambria Math" panose="02040503050406030204" pitchFamily="18" charset="0"/>
+                        </a:rPr>
+                        <m:t>𝐴</m:t>
+                      </m:r>
+                      <m:r>
+                        <a:rPr lang="tr-TR" b="0" i="1" smtClean="0">
+                          <a:latin typeface="Cambria Math" panose="02040503050406030204" pitchFamily="18" charset="0"/>
+                        </a:rPr>
+                        <m:t> →</m:t>
+                      </m:r>
+                      <m:sSubSup>
+                        <m:sSubSupPr>
+                          <m:ctrlPr>
+                            <a:rPr lang="tr-TR" b="0" i="1" smtClean="0">
+                              <a:latin typeface="Cambria Math" panose="02040503050406030204" pitchFamily="18" charset="0"/>
+                            </a:rPr>
+                          </m:ctrlPr>
+                        </m:sSubSupPr>
+                        <m:e>
+                          <m:r>
+                            <a:rPr lang="tr-TR" b="0" i="1" smtClean="0">
+                              <a:latin typeface="Cambria Math" panose="02040503050406030204" pitchFamily="18" charset="0"/>
+                            </a:rPr>
+                            <m:t>𝐼</m:t>
+                          </m:r>
+                        </m:e>
+                        <m:sub>
+                          <m:sSub>
+                            <m:sSubPr>
+                              <m:ctrlPr>
+                                <a:rPr lang="tr-TR" b="0" i="1" smtClean="0">
+                                  <a:latin typeface="Cambria Math" panose="02040503050406030204" pitchFamily="18" charset="0"/>
+                                </a:rPr>
+                              </m:ctrlPr>
+                            </m:sSubPr>
+                            <m:e>
+                              <m:r>
+                                <a:rPr lang="tr-TR" b="0" i="1" smtClean="0">
+                                  <a:latin typeface="Cambria Math" panose="02040503050406030204" pitchFamily="18" charset="0"/>
+                                </a:rPr>
+                                <m:t>𝐿</m:t>
+                              </m:r>
+                            </m:e>
+                            <m:sub>
+                              <m:r>
+                                <a:rPr lang="tr-TR" b="0" i="1" smtClean="0">
+                                  <a:latin typeface="Cambria Math" panose="02040503050406030204" pitchFamily="18" charset="0"/>
+                                </a:rPr>
+                                <m:t>𝑎𝑣𝑔</m:t>
+                              </m:r>
+                            </m:sub>
+                          </m:sSub>
+                        </m:sub>
+                        <m:sup>
+                          <m:r>
+                            <a:rPr lang="tr-TR" b="0" i="1" smtClean="0">
+                              <a:latin typeface="Cambria Math" panose="02040503050406030204" pitchFamily="18" charset="0"/>
+                            </a:rPr>
+                            <m:t>∗</m:t>
+                          </m:r>
+                        </m:sup>
+                      </m:sSubSup>
+                      <m:r>
+                        <a:rPr lang="tr-TR" b="0" i="1" smtClean="0">
+                          <a:latin typeface="Cambria Math" panose="02040503050406030204" pitchFamily="18" charset="0"/>
+                        </a:rPr>
+                        <m:t>=10 </m:t>
+                      </m:r>
+                      <m:r>
+                        <a:rPr lang="tr-TR" b="0" i="1" smtClean="0">
+                          <a:latin typeface="Cambria Math" panose="02040503050406030204" pitchFamily="18" charset="0"/>
+                        </a:rPr>
+                        <m:t>𝐴</m:t>
+                      </m:r>
+                    </m:oMath>
+                  </m:oMathPara>
+                </a14:m>
+                <a:endParaRPr lang="tr-TR" dirty="0"/>
+              </a:p>
+            </p:txBody>
+          </p:sp>
+        </mc:Choice>
+        <mc:Fallback>
+          <p:sp>
+            <p:nvSpPr>
+              <p:cNvPr id="10" name="TextBox 9"/>
+              <p:cNvSpPr txBox="1">
+                <a:spLocks noRot="1" noChangeAspect="1" noMove="1" noResize="1" noEditPoints="1" noAdjustHandles="1" noChangeArrowheads="1" noChangeShapeType="1" noTextEdit="1"/>
+              </p:cNvSpPr>
+              <p:nvPr/>
+            </p:nvSpPr>
+            <p:spPr>
+              <a:xfrm>
+                <a:off x="1041888" y="3709728"/>
+                <a:ext cx="2844625" cy="335028"/>
+              </a:xfrm>
+              <a:prstGeom prst="rect">
+                <a:avLst/>
+              </a:prstGeom>
+              <a:blipFill>
+                <a:blip r:embed="rId2"/>
+                <a:stretch>
+                  <a:fillRect l="-1713" r="-1285" b="-18182"/>
+                </a:stretch>
+              </a:blipFill>
+            </p:spPr>
+            <p:txBody>
+              <a:bodyPr/>
+              <a:lstStyle/>
+              <a:p>
+                <a:r>
+                  <a:rPr lang="tr-TR">
+                    <a:noFill/>
+                  </a:rPr>
+                  <a:t> </a:t>
+                </a:r>
+              </a:p>
+            </p:txBody>
+          </p:sp>
+        </mc:Fallback>
+      </mc:AlternateContent>
+      <mc:AlternateContent xmlns:mc="http://schemas.openxmlformats.org/markup-compatibility/2006">
+        <mc:Choice xmlns:a14="http://schemas.microsoft.com/office/drawing/2010/main" Requires="a14">
+          <p:sp>
+            <p:nvSpPr>
+              <p:cNvPr id="12" name="TextBox 11"/>
+              <p:cNvSpPr txBox="1"/>
+              <p:nvPr/>
+            </p:nvSpPr>
+            <p:spPr>
+              <a:xfrm>
+                <a:off x="1041888" y="4187864"/>
+                <a:ext cx="2941383" cy="333938"/>
+              </a:xfrm>
+              <a:prstGeom prst="rect">
+                <a:avLst/>
+              </a:prstGeom>
+              <a:noFill/>
+            </p:spPr>
+            <p:txBody>
+              <a:bodyPr wrap="none" lIns="0" tIns="0" rIns="0" bIns="0" rtlCol="0">
+                <a:spAutoFit/>
+              </a:bodyPr>
+              <a:lstStyle/>
+              <a:p>
+                <a14:m>
+                  <m:oMathPara xmlns:m="http://schemas.openxmlformats.org/officeDocument/2006/math">
+                    <m:oMathParaPr>
+                      <m:jc m:val="centerGroup"/>
+                    </m:oMathParaPr>
+                    <m:oMath xmlns:m="http://schemas.openxmlformats.org/officeDocument/2006/math">
+                      <m:sSub>
+                        <m:sSubPr>
+                          <m:ctrlPr>
+                            <a:rPr lang="tr-TR" b="0" i="1" smtClean="0">
+                              <a:latin typeface="Cambria Math" panose="02040503050406030204" pitchFamily="18" charset="0"/>
+                            </a:rPr>
+                          </m:ctrlPr>
+                        </m:sSubPr>
+                        <m:e>
+                          <m:r>
+                            <a:rPr lang="tr-TR" b="0" i="1" smtClean="0">
+                              <a:latin typeface="Cambria Math" panose="02040503050406030204" pitchFamily="18" charset="0"/>
+                            </a:rPr>
+                            <m:t>𝐼</m:t>
+                          </m:r>
+                        </m:e>
+                        <m:sub>
+                          <m:sSub>
+                            <m:sSubPr>
+                              <m:ctrlPr>
+                                <a:rPr lang="tr-TR" b="0" i="1" smtClean="0">
+                                  <a:latin typeface="Cambria Math" panose="02040503050406030204" pitchFamily="18" charset="0"/>
+                                </a:rPr>
+                              </m:ctrlPr>
+                            </m:sSubPr>
+                            <m:e>
+                              <m:r>
+                                <a:rPr lang="tr-TR" b="0" i="1" smtClean="0">
+                                  <a:latin typeface="Cambria Math" panose="02040503050406030204" pitchFamily="18" charset="0"/>
+                                </a:rPr>
+                                <m:t>𝐿</m:t>
+                              </m:r>
+                            </m:e>
+                            <m:sub>
+                              <m:r>
+                                <a:rPr lang="tr-TR" b="0" i="1" smtClean="0">
+                                  <a:latin typeface="Cambria Math" panose="02040503050406030204" pitchFamily="18" charset="0"/>
+                                </a:rPr>
+                                <m:t>𝑝𝑝</m:t>
+                              </m:r>
+                            </m:sub>
+                          </m:sSub>
+                        </m:sub>
+                      </m:sSub>
+                      <m:r>
+                        <a:rPr lang="tr-TR" b="0" i="1" smtClean="0">
+                          <a:latin typeface="Cambria Math" panose="02040503050406030204" pitchFamily="18" charset="0"/>
+                        </a:rPr>
+                        <m:t>=80 </m:t>
+                      </m:r>
+                      <m:r>
+                        <a:rPr lang="tr-TR" b="0" i="1" smtClean="0">
+                          <a:latin typeface="Cambria Math" panose="02040503050406030204" pitchFamily="18" charset="0"/>
+                        </a:rPr>
+                        <m:t>𝐴𝑝𝑝</m:t>
+                      </m:r>
+                      <m:r>
+                        <a:rPr lang="tr-TR" b="0" i="1" smtClean="0">
+                          <a:latin typeface="Cambria Math" panose="02040503050406030204" pitchFamily="18" charset="0"/>
+                        </a:rPr>
+                        <m:t> →</m:t>
+                      </m:r>
+                      <m:sSubSup>
+                        <m:sSubSupPr>
+                          <m:ctrlPr>
+                            <a:rPr lang="tr-TR" b="0" i="1" smtClean="0">
+                              <a:latin typeface="Cambria Math" panose="02040503050406030204" pitchFamily="18" charset="0"/>
+                            </a:rPr>
+                          </m:ctrlPr>
+                        </m:sSubSupPr>
+                        <m:e>
+                          <m:r>
+                            <a:rPr lang="tr-TR" b="0" i="1" smtClean="0">
+                              <a:latin typeface="Cambria Math" panose="02040503050406030204" pitchFamily="18" charset="0"/>
+                            </a:rPr>
+                            <m:t>𝐼</m:t>
+                          </m:r>
+                        </m:e>
+                        <m:sub>
+                          <m:sSub>
+                            <m:sSubPr>
+                              <m:ctrlPr>
+                                <a:rPr lang="tr-TR" b="0" i="1" smtClean="0">
+                                  <a:latin typeface="Cambria Math" panose="02040503050406030204" pitchFamily="18" charset="0"/>
+                                </a:rPr>
+                              </m:ctrlPr>
+                            </m:sSubPr>
+                            <m:e>
+                              <m:r>
+                                <a:rPr lang="tr-TR" b="0" i="1" smtClean="0">
+                                  <a:latin typeface="Cambria Math" panose="02040503050406030204" pitchFamily="18" charset="0"/>
+                                </a:rPr>
+                                <m:t>𝐿</m:t>
+                              </m:r>
+                            </m:e>
+                            <m:sub>
+                              <m:r>
+                                <a:rPr lang="tr-TR" b="0" i="1" smtClean="0">
+                                  <a:latin typeface="Cambria Math" panose="02040503050406030204" pitchFamily="18" charset="0"/>
+                                </a:rPr>
+                                <m:t>𝑝𝑝</m:t>
+                              </m:r>
+                            </m:sub>
+                          </m:sSub>
+                        </m:sub>
+                        <m:sup>
+                          <m:r>
+                            <a:rPr lang="tr-TR" b="0" i="1" smtClean="0">
+                              <a:latin typeface="Cambria Math" panose="02040503050406030204" pitchFamily="18" charset="0"/>
+                            </a:rPr>
+                            <m:t>∗</m:t>
+                          </m:r>
+                        </m:sup>
+                      </m:sSubSup>
+                      <m:r>
+                        <a:rPr lang="tr-TR" b="0" i="1" smtClean="0">
+                          <a:latin typeface="Cambria Math" panose="02040503050406030204" pitchFamily="18" charset="0"/>
+                        </a:rPr>
+                        <m:t>=40 </m:t>
+                      </m:r>
+                      <m:r>
+                        <a:rPr lang="tr-TR" b="0" i="1" smtClean="0">
+                          <a:latin typeface="Cambria Math" panose="02040503050406030204" pitchFamily="18" charset="0"/>
+                        </a:rPr>
+                        <m:t>𝐴</m:t>
+                      </m:r>
+                    </m:oMath>
+                  </m:oMathPara>
+                </a14:m>
+                <a:endParaRPr lang="tr-TR" dirty="0"/>
+              </a:p>
+            </p:txBody>
+          </p:sp>
+        </mc:Choice>
+        <mc:Fallback>
+          <p:sp>
+            <p:nvSpPr>
+              <p:cNvPr id="12" name="TextBox 11"/>
+              <p:cNvSpPr txBox="1">
+                <a:spLocks noRot="1" noChangeAspect="1" noMove="1" noResize="1" noEditPoints="1" noAdjustHandles="1" noChangeArrowheads="1" noChangeShapeType="1" noTextEdit="1"/>
+              </p:cNvSpPr>
+              <p:nvPr/>
+            </p:nvSpPr>
+            <p:spPr>
+              <a:xfrm>
+                <a:off x="1041888" y="4187864"/>
+                <a:ext cx="2941383" cy="333938"/>
+              </a:xfrm>
+              <a:prstGeom prst="rect">
+                <a:avLst/>
+              </a:prstGeom>
+              <a:blipFill>
+                <a:blip r:embed="rId3"/>
+                <a:stretch>
+                  <a:fillRect l="-1452" r="-1452" b="-18182"/>
+                </a:stretch>
+              </a:blipFill>
+            </p:spPr>
+            <p:txBody>
+              <a:bodyPr/>
+              <a:lstStyle/>
+              <a:p>
+                <a:r>
+                  <a:rPr lang="tr-TR">
+                    <a:noFill/>
+                  </a:rPr>
+                  <a:t> </a:t>
+                </a:r>
+              </a:p>
+            </p:txBody>
+          </p:sp>
+        </mc:Fallback>
+      </mc:AlternateContent>
+      <mc:AlternateContent xmlns:mc="http://schemas.openxmlformats.org/markup-compatibility/2006">
+        <mc:Choice xmlns:a14="http://schemas.microsoft.com/office/drawing/2010/main" Requires="a14">
+          <p:sp>
+            <p:nvSpPr>
+              <p:cNvPr id="13" name="TextBox 12"/>
+              <p:cNvSpPr txBox="1"/>
+              <p:nvPr/>
+            </p:nvSpPr>
+            <p:spPr>
+              <a:xfrm>
+                <a:off x="1041887" y="4664910"/>
+                <a:ext cx="5511765" cy="334772"/>
+              </a:xfrm>
+              <a:prstGeom prst="rect">
+                <a:avLst/>
+              </a:prstGeom>
+              <a:noFill/>
+            </p:spPr>
+            <p:txBody>
+              <a:bodyPr wrap="none" lIns="0" tIns="0" rIns="0" bIns="0" rtlCol="0">
+                <a:spAutoFit/>
+              </a:bodyPr>
+              <a:lstStyle/>
+              <a:p>
+                <a14:m>
+                  <m:oMathPara xmlns:m="http://schemas.openxmlformats.org/officeDocument/2006/math">
+                    <m:oMathParaPr>
+                      <m:jc m:val="centerGroup"/>
+                    </m:oMathParaPr>
+                    <m:oMath xmlns:m="http://schemas.openxmlformats.org/officeDocument/2006/math">
+                      <m:sSub>
+                        <m:sSubPr>
+                          <m:ctrlPr>
+                            <a:rPr lang="tr-TR" b="0" i="1" smtClean="0">
+                              <a:latin typeface="Cambria Math" panose="02040503050406030204" pitchFamily="18" charset="0"/>
+                            </a:rPr>
+                          </m:ctrlPr>
+                        </m:sSubPr>
+                        <m:e>
+                          <m:r>
+                            <a:rPr lang="tr-TR" b="0" i="1" smtClean="0">
+                              <a:latin typeface="Cambria Math" panose="02040503050406030204" pitchFamily="18" charset="0"/>
+                            </a:rPr>
+                            <m:t>𝐼</m:t>
+                          </m:r>
+                        </m:e>
+                        <m:sub>
+                          <m:sSub>
+                            <m:sSubPr>
+                              <m:ctrlPr>
+                                <a:rPr lang="tr-TR" b="0" i="1" smtClean="0">
+                                  <a:latin typeface="Cambria Math" panose="02040503050406030204" pitchFamily="18" charset="0"/>
+                                </a:rPr>
+                              </m:ctrlPr>
+                            </m:sSubPr>
+                            <m:e>
+                              <m:r>
+                                <a:rPr lang="tr-TR" b="0" i="1" smtClean="0">
+                                  <a:latin typeface="Cambria Math" panose="02040503050406030204" pitchFamily="18" charset="0"/>
+                                </a:rPr>
+                                <m:t>𝐶</m:t>
+                              </m:r>
+                            </m:e>
+                            <m:sub>
+                              <m:r>
+                                <a:rPr lang="tr-TR" b="0" i="1" smtClean="0">
+                                  <a:latin typeface="Cambria Math" panose="02040503050406030204" pitchFamily="18" charset="0"/>
+                                </a:rPr>
+                                <m:t>𝑝𝑝</m:t>
+                              </m:r>
+                            </m:sub>
+                          </m:sSub>
+                        </m:sub>
+                      </m:sSub>
+                      <m:r>
+                        <a:rPr lang="tr-TR" b="0" i="1" smtClean="0">
+                          <a:latin typeface="Cambria Math" panose="02040503050406030204" pitchFamily="18" charset="0"/>
+                        </a:rPr>
+                        <m:t>=80 </m:t>
+                      </m:r>
+                      <m:r>
+                        <a:rPr lang="tr-TR" b="0" i="1" smtClean="0">
+                          <a:latin typeface="Cambria Math" panose="02040503050406030204" pitchFamily="18" charset="0"/>
+                        </a:rPr>
+                        <m:t>𝐴𝑝𝑝</m:t>
+                      </m:r>
+                      <m:r>
+                        <a:rPr lang="tr-TR" b="0" i="1" smtClean="0">
+                          <a:latin typeface="Cambria Math" panose="02040503050406030204" pitchFamily="18" charset="0"/>
+                        </a:rPr>
+                        <m:t> @ 100 </m:t>
+                      </m:r>
+                      <m:r>
+                        <a:rPr lang="tr-TR" b="0" i="1" smtClean="0">
+                          <a:latin typeface="Cambria Math" panose="02040503050406030204" pitchFamily="18" charset="0"/>
+                        </a:rPr>
+                        <m:t>𝑘𝐻𝑧</m:t>
+                      </m:r>
+                      <m:r>
+                        <a:rPr lang="tr-TR" b="0" i="1" smtClean="0">
+                          <a:latin typeface="Cambria Math" panose="02040503050406030204" pitchFamily="18" charset="0"/>
+                        </a:rPr>
+                        <m:t> →</m:t>
+                      </m:r>
+                      <m:sSubSup>
+                        <m:sSubSupPr>
+                          <m:ctrlPr>
+                            <a:rPr lang="tr-TR" b="0" i="1" smtClean="0">
+                              <a:latin typeface="Cambria Math" panose="02040503050406030204" pitchFamily="18" charset="0"/>
+                            </a:rPr>
+                          </m:ctrlPr>
+                        </m:sSubSupPr>
+                        <m:e>
+                          <m:r>
+                            <a:rPr lang="tr-TR" b="0" i="1" smtClean="0">
+                              <a:latin typeface="Cambria Math" panose="02040503050406030204" pitchFamily="18" charset="0"/>
+                            </a:rPr>
+                            <m:t>𝐼</m:t>
+                          </m:r>
+                        </m:e>
+                        <m:sub>
+                          <m:sSub>
+                            <m:sSubPr>
+                              <m:ctrlPr>
+                                <a:rPr lang="tr-TR" b="0" i="1" smtClean="0">
+                                  <a:latin typeface="Cambria Math" panose="02040503050406030204" pitchFamily="18" charset="0"/>
+                                </a:rPr>
+                              </m:ctrlPr>
+                            </m:sSubPr>
+                            <m:e>
+                              <m:r>
+                                <a:rPr lang="tr-TR" b="0" i="1" smtClean="0">
+                                  <a:latin typeface="Cambria Math" panose="02040503050406030204" pitchFamily="18" charset="0"/>
+                                </a:rPr>
+                                <m:t>𝐶</m:t>
+                              </m:r>
+                            </m:e>
+                            <m:sub>
+                              <m:r>
+                                <a:rPr lang="tr-TR" b="0" i="1" smtClean="0">
+                                  <a:latin typeface="Cambria Math" panose="02040503050406030204" pitchFamily="18" charset="0"/>
+                                </a:rPr>
+                                <m:t>𝑝𝑝</m:t>
+                              </m:r>
+                            </m:sub>
+                          </m:sSub>
+                        </m:sub>
+                        <m:sup>
+                          <m:r>
+                            <a:rPr lang="tr-TR" b="0" i="1" smtClean="0">
+                              <a:latin typeface="Cambria Math" panose="02040503050406030204" pitchFamily="18" charset="0"/>
+                            </a:rPr>
+                            <m:t>∗</m:t>
+                          </m:r>
+                        </m:sup>
+                      </m:sSubSup>
+                      <m:r>
+                        <a:rPr lang="tr-TR" b="0" i="1" smtClean="0">
+                          <a:latin typeface="Cambria Math" panose="02040503050406030204" pitchFamily="18" charset="0"/>
+                        </a:rPr>
+                        <m:t>=26 </m:t>
+                      </m:r>
+                      <m:r>
+                        <a:rPr lang="tr-TR" b="0" i="1" smtClean="0">
+                          <a:latin typeface="Cambria Math" panose="02040503050406030204" pitchFamily="18" charset="0"/>
+                        </a:rPr>
+                        <m:t>𝐴𝑝𝑝</m:t>
+                      </m:r>
+                      <m:r>
+                        <a:rPr lang="tr-TR" b="0" i="1" smtClean="0">
+                          <a:latin typeface="Cambria Math" panose="02040503050406030204" pitchFamily="18" charset="0"/>
+                        </a:rPr>
+                        <m:t> @ 200 </m:t>
+                      </m:r>
+                      <m:r>
+                        <a:rPr lang="tr-TR" b="0" i="1" smtClean="0">
+                          <a:latin typeface="Cambria Math" panose="02040503050406030204" pitchFamily="18" charset="0"/>
+                        </a:rPr>
+                        <m:t>𝑘𝐻𝑧</m:t>
+                      </m:r>
+                    </m:oMath>
+                  </m:oMathPara>
+                </a14:m>
+                <a:endParaRPr lang="tr-TR" dirty="0"/>
+              </a:p>
+            </p:txBody>
+          </p:sp>
+        </mc:Choice>
+        <mc:Fallback>
+          <p:sp>
+            <p:nvSpPr>
+              <p:cNvPr id="13" name="TextBox 12"/>
+              <p:cNvSpPr txBox="1">
+                <a:spLocks noRot="1" noChangeAspect="1" noMove="1" noResize="1" noEditPoints="1" noAdjustHandles="1" noChangeArrowheads="1" noChangeShapeType="1" noTextEdit="1"/>
+              </p:cNvSpPr>
+              <p:nvPr/>
+            </p:nvSpPr>
+            <p:spPr>
+              <a:xfrm>
+                <a:off x="1041887" y="4664910"/>
+                <a:ext cx="5511765" cy="334772"/>
+              </a:xfrm>
+              <a:prstGeom prst="rect">
+                <a:avLst/>
+              </a:prstGeom>
+              <a:blipFill>
+                <a:blip r:embed="rId4"/>
+                <a:stretch>
+                  <a:fillRect l="-553" r="-553" b="-18182"/>
+                </a:stretch>
+              </a:blipFill>
+            </p:spPr>
+            <p:txBody>
+              <a:bodyPr/>
+              <a:lstStyle/>
+              <a:p>
+                <a:r>
+                  <a:rPr lang="tr-TR">
+                    <a:noFill/>
+                  </a:rPr>
+                  <a:t> </a:t>
+                </a:r>
+              </a:p>
+            </p:txBody>
+          </p:sp>
+        </mc:Fallback>
+      </mc:AlternateContent>
+    </p:spTree>
+    <p:extLst>
+      <p:ext uri="{BB962C8B-B14F-4D97-AF65-F5344CB8AC3E}">
+        <p14:creationId xmlns:p14="http://schemas.microsoft.com/office/powerpoint/2010/main" val="3550477216"/>
+      </p:ext>
+    </p:extLst>
+  </p:cSld>
+  <p:clrMapOvr>
+    <a:masterClrMapping/>
+  </p:clrMapOvr>
+</p:sld>
+</file>
+
+<file path=ppt/slides/slide14.xml><?xml version="1.0" encoding="utf-8"?>
+<p:sld xmlns:a="http://schemas.openxmlformats.org/drawingml/2006/main" xmlns:r="http://schemas.openxmlformats.org/officeDocument/2006/relationships" xmlns:p="http://schemas.openxmlformats.org/presentationml/2006/main">
+  <p:cSld>
+    <p:spTree>
+      <p:nvGrpSpPr>
+        <p:cNvPr id="1" name=""/>
+        <p:cNvGrpSpPr/>
+        <p:nvPr/>
+      </p:nvGrpSpPr>
+      <p:grpSpPr>
+        <a:xfrm>
+          <a:off x="0" y="0"/>
+          <a:ext cx="0" cy="0"/>
+          <a:chOff x="0" y="0"/>
+          <a:chExt cx="0" cy="0"/>
+        </a:xfrm>
+      </p:grpSpPr>
+      <p:pic>
+        <p:nvPicPr>
+          <p:cNvPr id="12" name="Picture 11"/>
+          <p:cNvPicPr>
+            <a:picLocks noChangeAspect="1"/>
+          </p:cNvPicPr>
+          <p:nvPr/>
+        </p:nvPicPr>
+        <p:blipFill>
+          <a:blip r:embed="rId2"/>
+          <a:stretch>
+            <a:fillRect/>
+          </a:stretch>
+        </p:blipFill>
+        <p:spPr>
+          <a:xfrm>
+            <a:off x="6348412" y="1822849"/>
+            <a:ext cx="4524375" cy="3838575"/>
+          </a:xfrm>
+          <a:prstGeom prst="rect">
+            <a:avLst/>
+          </a:prstGeom>
+        </p:spPr>
+      </p:pic>
+      <p:pic>
+        <p:nvPicPr>
+          <p:cNvPr id="8" name="Picture 7"/>
+          <p:cNvPicPr>
+            <a:picLocks noChangeAspect="1"/>
+          </p:cNvPicPr>
+          <p:nvPr/>
+        </p:nvPicPr>
+        <p:blipFill>
+          <a:blip r:embed="rId3"/>
+          <a:stretch>
+            <a:fillRect/>
+          </a:stretch>
+        </p:blipFill>
+        <p:spPr>
+          <a:xfrm>
+            <a:off x="730127" y="1822849"/>
+            <a:ext cx="4524375" cy="3838575"/>
+          </a:xfrm>
+          <a:prstGeom prst="rect">
+            <a:avLst/>
+          </a:prstGeom>
+        </p:spPr>
+      </p:pic>
+      <p:sp>
+        <p:nvSpPr>
+          <p:cNvPr id="4" name="Slide Number Placeholder 3"/>
+          <p:cNvSpPr>
+            <a:spLocks noGrp="1"/>
+          </p:cNvSpPr>
+          <p:nvPr>
+            <p:ph type="sldNum" sz="quarter" idx="12"/>
+          </p:nvPr>
+        </p:nvSpPr>
+        <p:spPr/>
+        <p:txBody>
+          <a:bodyPr/>
+          <a:lstStyle/>
+          <a:p>
+            <a:fld id="{178508F5-8E49-4F57-B165-331DE2AB85B8}" type="slidenum">
+              <a:rPr lang="tr-TR" sz="1800" smtClean="0"/>
+              <a:t>14</a:t>
+            </a:fld>
+            <a:endParaRPr lang="tr-TR" dirty="0"/>
+          </a:p>
+        </p:txBody>
+      </p:sp>
+      <p:sp>
+        <p:nvSpPr>
+          <p:cNvPr id="5" name="TextBox 4"/>
+          <p:cNvSpPr txBox="1"/>
+          <p:nvPr/>
+        </p:nvSpPr>
+        <p:spPr>
+          <a:xfrm>
+            <a:off x="562707" y="316523"/>
+            <a:ext cx="2558562" cy="461665"/>
+          </a:xfrm>
+          <a:prstGeom prst="rect">
+            <a:avLst/>
+          </a:prstGeom>
+          <a:noFill/>
+        </p:spPr>
+        <p:txBody>
+          <a:bodyPr wrap="square" rtlCol="0">
+            <a:spAutoFit/>
+          </a:bodyPr>
+          <a:lstStyle/>
+          <a:p>
+            <a:r>
+              <a:rPr lang="tr-TR" sz="2400" dirty="0" smtClean="0"/>
+              <a:t>Simulation Study</a:t>
+            </a:r>
+            <a:endParaRPr lang="tr-TR" sz="2400" dirty="0"/>
+          </a:p>
+        </p:txBody>
+      </p:sp>
+      <p:sp>
+        <p:nvSpPr>
+          <p:cNvPr id="2" name="TextBox 1"/>
+          <p:cNvSpPr txBox="1"/>
+          <p:nvPr/>
+        </p:nvSpPr>
+        <p:spPr>
+          <a:xfrm>
+            <a:off x="3800475" y="85690"/>
+            <a:ext cx="3419475" cy="1477328"/>
+          </a:xfrm>
+          <a:prstGeom prst="rect">
+            <a:avLst/>
+          </a:prstGeom>
+          <a:noFill/>
+        </p:spPr>
+        <p:txBody>
+          <a:bodyPr wrap="square" rtlCol="0">
+            <a:spAutoFit/>
+          </a:bodyPr>
+          <a:lstStyle/>
+          <a:p>
+            <a:r>
+              <a:rPr lang="tr-TR" dirty="0" smtClean="0"/>
+              <a:t>K = 4 -&gt; Synch. switch</a:t>
+            </a:r>
+            <a:r>
+              <a:rPr lang="tr-TR" b="1" dirty="0" smtClean="0"/>
+              <a:t/>
+            </a:r>
+            <a:br>
+              <a:rPr lang="tr-TR" b="1" dirty="0" smtClean="0"/>
+            </a:br>
+            <a:r>
+              <a:rPr lang="tr-TR" dirty="0" smtClean="0"/>
+              <a:t>Vin = 540V</a:t>
+            </a:r>
+          </a:p>
+          <a:p>
+            <a:r>
+              <a:rPr lang="tr-TR" dirty="0" smtClean="0"/>
+              <a:t>Vout </a:t>
+            </a:r>
+            <a:r>
+              <a:rPr lang="tr-TR" dirty="0"/>
+              <a:t>= </a:t>
+            </a:r>
+            <a:r>
+              <a:rPr lang="tr-TR" dirty="0" smtClean="0"/>
+              <a:t>400V, Pout = 8 kW </a:t>
+            </a:r>
+          </a:p>
+          <a:p>
+            <a:r>
+              <a:rPr lang="tr-TR" dirty="0"/>
+              <a:t>fsw = 100 </a:t>
+            </a:r>
+            <a:r>
+              <a:rPr lang="tr-TR" dirty="0" smtClean="0"/>
+              <a:t>kHz, Tj = 125˚C</a:t>
+            </a:r>
+          </a:p>
+          <a:p>
+            <a:r>
+              <a:rPr lang="tr-TR" dirty="0" smtClean="0"/>
+              <a:t>With </a:t>
+            </a:r>
+            <a:r>
+              <a:rPr lang="tr-TR" b="1" dirty="0" smtClean="0"/>
+              <a:t>Interleaving</a:t>
+            </a:r>
+            <a:endParaRPr lang="tr-TR" b="1" dirty="0"/>
+          </a:p>
+        </p:txBody>
+      </p:sp>
+      <p:sp>
+        <p:nvSpPr>
+          <p:cNvPr id="9" name="TextBox 8"/>
+          <p:cNvSpPr txBox="1"/>
+          <p:nvPr/>
+        </p:nvSpPr>
+        <p:spPr>
+          <a:xfrm>
+            <a:off x="2324100" y="1126093"/>
+            <a:ext cx="1943100" cy="369332"/>
+          </a:xfrm>
+          <a:prstGeom prst="rect">
+            <a:avLst/>
+          </a:prstGeom>
+          <a:noFill/>
+        </p:spPr>
+        <p:txBody>
+          <a:bodyPr wrap="square" rtlCol="0">
+            <a:spAutoFit/>
+          </a:bodyPr>
+          <a:lstStyle/>
+          <a:p>
+            <a:r>
+              <a:rPr lang="tr-TR" dirty="0" smtClean="0"/>
+              <a:t>Top Switch</a:t>
+            </a:r>
+            <a:endParaRPr lang="tr-TR" dirty="0"/>
+          </a:p>
+        </p:txBody>
+      </p:sp>
+      <p:sp>
+        <p:nvSpPr>
+          <p:cNvPr id="10" name="TextBox 9"/>
+          <p:cNvSpPr txBox="1"/>
+          <p:nvPr/>
+        </p:nvSpPr>
+        <p:spPr>
+          <a:xfrm>
+            <a:off x="2676525" y="2343150"/>
+            <a:ext cx="2247900" cy="830997"/>
+          </a:xfrm>
+          <a:prstGeom prst="rect">
+            <a:avLst/>
+          </a:prstGeom>
+          <a:noFill/>
+        </p:spPr>
+        <p:txBody>
+          <a:bodyPr wrap="square" rtlCol="0">
+            <a:spAutoFit/>
+          </a:bodyPr>
+          <a:lstStyle/>
+          <a:p>
+            <a:r>
+              <a:rPr lang="tr-TR" sz="2400" dirty="0" smtClean="0"/>
+              <a:t>Power Loss</a:t>
+            </a:r>
+            <a:br>
+              <a:rPr lang="tr-TR" sz="2400" dirty="0" smtClean="0"/>
+            </a:br>
+            <a:r>
+              <a:rPr lang="tr-TR" sz="2400" b="1" dirty="0" smtClean="0"/>
+              <a:t>5.2144 W</a:t>
+            </a:r>
+            <a:endParaRPr lang="tr-TR" sz="2400" b="1" dirty="0"/>
+          </a:p>
+        </p:txBody>
+      </p:sp>
+      <p:sp>
+        <p:nvSpPr>
+          <p:cNvPr id="13" name="TextBox 12"/>
+          <p:cNvSpPr txBox="1"/>
+          <p:nvPr/>
+        </p:nvSpPr>
+        <p:spPr>
+          <a:xfrm>
+            <a:off x="8277225" y="1149350"/>
+            <a:ext cx="1943100" cy="369332"/>
+          </a:xfrm>
+          <a:prstGeom prst="rect">
+            <a:avLst/>
+          </a:prstGeom>
+          <a:noFill/>
+        </p:spPr>
+        <p:txBody>
+          <a:bodyPr wrap="square" rtlCol="0">
+            <a:spAutoFit/>
+          </a:bodyPr>
+          <a:lstStyle/>
+          <a:p>
+            <a:r>
+              <a:rPr lang="tr-TR" dirty="0" smtClean="0"/>
+              <a:t>Bottom Switch</a:t>
+            </a:r>
+            <a:endParaRPr lang="tr-TR" dirty="0"/>
+          </a:p>
+        </p:txBody>
+      </p:sp>
+      <p:sp>
+        <p:nvSpPr>
+          <p:cNvPr id="14" name="TextBox 13"/>
+          <p:cNvSpPr txBox="1"/>
+          <p:nvPr/>
+        </p:nvSpPr>
+        <p:spPr>
+          <a:xfrm>
+            <a:off x="8858250" y="2343150"/>
+            <a:ext cx="2247900" cy="830997"/>
+          </a:xfrm>
+          <a:prstGeom prst="rect">
+            <a:avLst/>
+          </a:prstGeom>
+          <a:noFill/>
+        </p:spPr>
+        <p:txBody>
+          <a:bodyPr wrap="square" rtlCol="0">
+            <a:spAutoFit/>
+          </a:bodyPr>
+          <a:lstStyle/>
+          <a:p>
+            <a:r>
+              <a:rPr lang="tr-TR" sz="2400" dirty="0" smtClean="0"/>
+              <a:t>Power Loss</a:t>
+            </a:r>
+            <a:br>
+              <a:rPr lang="tr-TR" sz="2400" dirty="0" smtClean="0"/>
+            </a:br>
+            <a:r>
+              <a:rPr lang="tr-TR" sz="2400" b="1" dirty="0" smtClean="0"/>
+              <a:t>2.0775 W</a:t>
+            </a:r>
+            <a:endParaRPr lang="tr-TR" sz="2400" b="1" dirty="0"/>
+          </a:p>
+        </p:txBody>
+      </p:sp>
+      <p:sp>
+        <p:nvSpPr>
+          <p:cNvPr id="15" name="TextBox 14"/>
+          <p:cNvSpPr txBox="1"/>
+          <p:nvPr/>
+        </p:nvSpPr>
+        <p:spPr>
+          <a:xfrm>
+            <a:off x="3433763" y="6198255"/>
+            <a:ext cx="5695950" cy="523220"/>
+          </a:xfrm>
+          <a:prstGeom prst="rect">
+            <a:avLst/>
+          </a:prstGeom>
+          <a:noFill/>
+        </p:spPr>
+        <p:txBody>
+          <a:bodyPr wrap="square" rtlCol="0">
+            <a:spAutoFit/>
+          </a:bodyPr>
+          <a:lstStyle/>
+          <a:p>
+            <a:r>
+              <a:rPr lang="tr-TR" sz="2800" b="1" dirty="0" smtClean="0"/>
+              <a:t>Total Transistor Loss = 29.1676 W</a:t>
+            </a:r>
+            <a:endParaRPr lang="tr-TR" sz="2800" b="1" dirty="0"/>
+          </a:p>
+        </p:txBody>
+      </p:sp>
+      <p:sp>
+        <p:nvSpPr>
+          <p:cNvPr id="16" name="TextBox 15"/>
+          <p:cNvSpPr txBox="1"/>
+          <p:nvPr/>
+        </p:nvSpPr>
+        <p:spPr>
+          <a:xfrm>
+            <a:off x="7538854" y="447378"/>
+            <a:ext cx="3419841" cy="461665"/>
+          </a:xfrm>
+          <a:prstGeom prst="rect">
+            <a:avLst/>
+          </a:prstGeom>
+          <a:noFill/>
+        </p:spPr>
+        <p:txBody>
+          <a:bodyPr wrap="square" rtlCol="0">
+            <a:spAutoFit/>
+          </a:bodyPr>
+          <a:lstStyle/>
+          <a:p>
+            <a:r>
+              <a:rPr lang="tr-TR" sz="2400" b="1" dirty="0" smtClean="0"/>
+              <a:t>26 App Ripple @ 200 kHz</a:t>
+            </a:r>
+            <a:endParaRPr lang="tr-TR" sz="2400" b="1" dirty="0"/>
+          </a:p>
+        </p:txBody>
+      </p:sp>
+      <p:sp>
+        <p:nvSpPr>
+          <p:cNvPr id="11" name="TextBox 10"/>
+          <p:cNvSpPr txBox="1"/>
+          <p:nvPr/>
+        </p:nvSpPr>
+        <p:spPr>
+          <a:xfrm>
+            <a:off x="8515349" y="6198255"/>
+            <a:ext cx="857251" cy="523220"/>
+          </a:xfrm>
+          <a:prstGeom prst="rect">
+            <a:avLst/>
+          </a:prstGeom>
+          <a:noFill/>
+        </p:spPr>
+        <p:txBody>
+          <a:bodyPr wrap="square" rtlCol="0">
+            <a:spAutoFit/>
+          </a:bodyPr>
+          <a:lstStyle/>
+          <a:p>
+            <a:r>
+              <a:rPr lang="tr-TR" sz="2800" b="1" dirty="0" smtClean="0">
+                <a:solidFill>
+                  <a:srgbClr val="00B050"/>
+                </a:solidFill>
+              </a:rPr>
+              <a:t>%15 </a:t>
+            </a:r>
+            <a:endParaRPr lang="tr-TR" sz="2800" b="1" dirty="0">
+              <a:solidFill>
+                <a:srgbClr val="00B050"/>
+              </a:solidFill>
+            </a:endParaRPr>
+          </a:p>
+        </p:txBody>
+      </p:sp>
+      <p:sp>
+        <p:nvSpPr>
+          <p:cNvPr id="17" name="Down Arrow 16"/>
+          <p:cNvSpPr/>
+          <p:nvPr/>
+        </p:nvSpPr>
+        <p:spPr>
+          <a:xfrm>
+            <a:off x="9248775" y="6267450"/>
+            <a:ext cx="276225" cy="454025"/>
+          </a:xfrm>
+          <a:prstGeom prst="downArrow">
+            <a:avLst/>
+          </a:prstGeom>
+          <a:solidFill>
+            <a:srgbClr val="00B050"/>
+          </a:solidFill>
+          <a:ln>
+            <a:solidFill>
+              <a:srgbClr val="00B050"/>
+            </a:solidFill>
+          </a:ln>
+        </p:spPr>
+        <p:style>
+          <a:lnRef idx="2">
+            <a:schemeClr val="accent1">
+              <a:shade val="50000"/>
+            </a:schemeClr>
+          </a:lnRef>
+          <a:fillRef idx="1">
+            <a:schemeClr val="accent1"/>
+          </a:fillRef>
+          <a:effectRef idx="0">
+            <a:schemeClr val="accent1"/>
+          </a:effectRef>
+          <a:fontRef idx="minor">
+            <a:schemeClr val="lt1"/>
+          </a:fontRef>
+        </p:style>
+        <p:txBody>
+          <a:bodyPr rtlCol="0" anchor="ctr"/>
+          <a:lstStyle/>
+          <a:p>
+            <a:pPr algn="ctr"/>
+            <a:endParaRPr lang="tr-TR"/>
+          </a:p>
+        </p:txBody>
+      </p:sp>
+    </p:spTree>
+    <p:extLst>
+      <p:ext uri="{BB962C8B-B14F-4D97-AF65-F5344CB8AC3E}">
+        <p14:creationId xmlns:p14="http://schemas.microsoft.com/office/powerpoint/2010/main" val="1500972403"/>
+      </p:ext>
+    </p:extLst>
+  </p:cSld>
+  <p:clrMapOvr>
+    <a:masterClrMapping/>
+  </p:clrMapOvr>
 </p:sld>
 </file>
 
@@ -4400,6 +6903,13 @@
   <p:clrMapOvr>
     <a:masterClrMapping/>
   </p:clrMapOvr>
+  <p:timing>
+    <p:tnLst>
+      <p:par>
+        <p:cTn id="1" dur="indefinite" restart="never" nodeType="tmRoot"/>
+      </p:par>
+    </p:tnLst>
+  </p:timing>
 </p:sld>
 </file>
 
@@ -4863,6 +7373,13 @@
   <p:clrMapOvr>
     <a:masterClrMapping/>
   </p:clrMapOvr>
+  <p:timing>
+    <p:tnLst>
+      <p:par>
+        <p:cTn id="1" dur="indefinite" restart="never" nodeType="tmRoot"/>
+      </p:par>
+    </p:tnLst>
+  </p:timing>
 </p:sld>
 </file>
 
@@ -5163,6 +7680,13 @@
   <p:clrMapOvr>
     <a:masterClrMapping/>
   </p:clrMapOvr>
+  <p:timing>
+    <p:tnLst>
+      <p:par>
+        <p:cTn id="1" dur="indefinite" restart="never" nodeType="tmRoot"/>
+      </p:par>
+    </p:tnLst>
+  </p:timing>
 </p:sld>
 </file>
 
@@ -5507,6 +8031,13 @@
   <p:clrMapOvr>
     <a:masterClrMapping/>
   </p:clrMapOvr>
+  <p:timing>
+    <p:tnLst>
+      <p:par>
+        <p:cTn id="1" dur="indefinite" restart="never" nodeType="tmRoot"/>
+      </p:par>
+    </p:tnLst>
+  </p:timing>
 </p:sld>
 </file>
 
@@ -5803,6 +8334,13 @@
   <p:clrMapOvr>
     <a:masterClrMapping/>
   </p:clrMapOvr>
+  <p:timing>
+    <p:tnLst>
+      <p:par>
+        <p:cTn id="1" dur="indefinite" restart="never" nodeType="tmRoot"/>
+      </p:par>
+    </p:tnLst>
+  </p:timing>
 </p:sld>
 </file>
 
@@ -6141,6 +8679,510 @@
     <p:extLst>
       <p:ext uri="{BB962C8B-B14F-4D97-AF65-F5344CB8AC3E}">
         <p14:creationId xmlns:p14="http://schemas.microsoft.com/office/powerpoint/2010/main" val="3133860449"/>
+      </p:ext>
+    </p:extLst>
+  </p:cSld>
+  <p:clrMapOvr>
+    <a:masterClrMapping/>
+  </p:clrMapOvr>
+  <p:timing>
+    <p:tnLst>
+      <p:par>
+        <p:cTn id="1" dur="indefinite" restart="never" nodeType="tmRoot"/>
+      </p:par>
+    </p:tnLst>
+  </p:timing>
+</p:sld>
+</file>
+
+<file path=ppt/slides/slide8.xml><?xml version="1.0" encoding="utf-8"?>
+<p:sld xmlns:a="http://schemas.openxmlformats.org/drawingml/2006/main" xmlns:r="http://schemas.openxmlformats.org/officeDocument/2006/relationships" xmlns:p="http://schemas.openxmlformats.org/presentationml/2006/main">
+  <p:cSld>
+    <p:spTree>
+      <p:nvGrpSpPr>
+        <p:cNvPr id="1" name=""/>
+        <p:cNvGrpSpPr/>
+        <p:nvPr/>
+      </p:nvGrpSpPr>
+      <p:grpSpPr>
+        <a:xfrm>
+          <a:off x="0" y="0"/>
+          <a:ext cx="0" cy="0"/>
+          <a:chOff x="0" y="0"/>
+          <a:chExt cx="0" cy="0"/>
+        </a:xfrm>
+      </p:grpSpPr>
+      <p:sp>
+        <p:nvSpPr>
+          <p:cNvPr id="4" name="Slide Number Placeholder 3"/>
+          <p:cNvSpPr>
+            <a:spLocks noGrp="1"/>
+          </p:cNvSpPr>
+          <p:nvPr>
+            <p:ph type="sldNum" sz="quarter" idx="12"/>
+          </p:nvPr>
+        </p:nvSpPr>
+        <p:spPr/>
+        <p:txBody>
+          <a:bodyPr/>
+          <a:lstStyle/>
+          <a:p>
+            <a:fld id="{178508F5-8E49-4F57-B165-331DE2AB85B8}" type="slidenum">
+              <a:rPr lang="tr-TR" sz="1800" smtClean="0"/>
+              <a:t>8</a:t>
+            </a:fld>
+            <a:endParaRPr lang="tr-TR" sz="1800" dirty="0"/>
+          </a:p>
+        </p:txBody>
+      </p:sp>
+      <p:sp>
+        <p:nvSpPr>
+          <p:cNvPr id="5" name="TextBox 4"/>
+          <p:cNvSpPr txBox="1"/>
+          <p:nvPr/>
+        </p:nvSpPr>
+        <p:spPr>
+          <a:xfrm>
+            <a:off x="562707" y="316523"/>
+            <a:ext cx="2558562" cy="461665"/>
+          </a:xfrm>
+          <a:prstGeom prst="rect">
+            <a:avLst/>
+          </a:prstGeom>
+          <a:noFill/>
+        </p:spPr>
+        <p:txBody>
+          <a:bodyPr wrap="square" rtlCol="0">
+            <a:spAutoFit/>
+          </a:bodyPr>
+          <a:lstStyle/>
+          <a:p>
+            <a:r>
+              <a:rPr lang="tr-TR" sz="2400" dirty="0" smtClean="0"/>
+              <a:t>Simulation Study</a:t>
+            </a:r>
+            <a:endParaRPr lang="tr-TR" sz="2400" dirty="0"/>
+          </a:p>
+        </p:txBody>
+      </p:sp>
+      <p:pic>
+        <p:nvPicPr>
+          <p:cNvPr id="7" name="Picture 6"/>
+          <p:cNvPicPr>
+            <a:picLocks noChangeAspect="1"/>
+          </p:cNvPicPr>
+          <p:nvPr/>
+        </p:nvPicPr>
+        <p:blipFill>
+          <a:blip r:embed="rId2"/>
+          <a:stretch>
+            <a:fillRect/>
+          </a:stretch>
+        </p:blipFill>
+        <p:spPr>
+          <a:xfrm>
+            <a:off x="438150" y="1037364"/>
+            <a:ext cx="11077076" cy="5211036"/>
+          </a:xfrm>
+          <a:prstGeom prst="rect">
+            <a:avLst/>
+          </a:prstGeom>
+        </p:spPr>
+      </p:pic>
+    </p:spTree>
+    <p:extLst>
+      <p:ext uri="{BB962C8B-B14F-4D97-AF65-F5344CB8AC3E}">
+        <p14:creationId xmlns:p14="http://schemas.microsoft.com/office/powerpoint/2010/main" val="2596475110"/>
+      </p:ext>
+    </p:extLst>
+  </p:cSld>
+  <p:clrMapOvr>
+    <a:masterClrMapping/>
+  </p:clrMapOvr>
+</p:sld>
+</file>
+
+<file path=ppt/slides/slide9.xml><?xml version="1.0" encoding="utf-8"?>
+<p:sld xmlns:a="http://schemas.openxmlformats.org/drawingml/2006/main" xmlns:r="http://schemas.openxmlformats.org/officeDocument/2006/relationships" xmlns:p="http://schemas.openxmlformats.org/presentationml/2006/main">
+  <p:cSld>
+    <p:spTree>
+      <p:nvGrpSpPr>
+        <p:cNvPr id="1" name=""/>
+        <p:cNvGrpSpPr/>
+        <p:nvPr/>
+      </p:nvGrpSpPr>
+      <p:grpSpPr>
+        <a:xfrm>
+          <a:off x="0" y="0"/>
+          <a:ext cx="0" cy="0"/>
+          <a:chOff x="0" y="0"/>
+          <a:chExt cx="0" cy="0"/>
+        </a:xfrm>
+      </p:grpSpPr>
+      <p:sp>
+        <p:nvSpPr>
+          <p:cNvPr id="4" name="Slide Number Placeholder 3"/>
+          <p:cNvSpPr>
+            <a:spLocks noGrp="1"/>
+          </p:cNvSpPr>
+          <p:nvPr>
+            <p:ph type="sldNum" sz="quarter" idx="12"/>
+          </p:nvPr>
+        </p:nvSpPr>
+        <p:spPr/>
+        <p:txBody>
+          <a:bodyPr/>
+          <a:lstStyle/>
+          <a:p>
+            <a:fld id="{178508F5-8E49-4F57-B165-331DE2AB85B8}" type="slidenum">
+              <a:rPr lang="tr-TR" sz="1800" smtClean="0"/>
+              <a:t>9</a:t>
+            </a:fld>
+            <a:endParaRPr lang="tr-TR" dirty="0"/>
+          </a:p>
+        </p:txBody>
+      </p:sp>
+      <p:sp>
+        <p:nvSpPr>
+          <p:cNvPr id="5" name="TextBox 4"/>
+          <p:cNvSpPr txBox="1"/>
+          <p:nvPr/>
+        </p:nvSpPr>
+        <p:spPr>
+          <a:xfrm>
+            <a:off x="562707" y="316523"/>
+            <a:ext cx="2558562" cy="461665"/>
+          </a:xfrm>
+          <a:prstGeom prst="rect">
+            <a:avLst/>
+          </a:prstGeom>
+          <a:noFill/>
+        </p:spPr>
+        <p:txBody>
+          <a:bodyPr wrap="square" rtlCol="0">
+            <a:spAutoFit/>
+          </a:bodyPr>
+          <a:lstStyle/>
+          <a:p>
+            <a:r>
+              <a:rPr lang="tr-TR" sz="2400" dirty="0" smtClean="0"/>
+              <a:t>Simulation Study</a:t>
+            </a:r>
+            <a:endParaRPr lang="tr-TR" sz="2400" dirty="0"/>
+          </a:p>
+        </p:txBody>
+      </p:sp>
+      <p:sp>
+        <p:nvSpPr>
+          <p:cNvPr id="2" name="TextBox 1"/>
+          <p:cNvSpPr txBox="1"/>
+          <p:nvPr/>
+        </p:nvSpPr>
+        <p:spPr>
+          <a:xfrm>
+            <a:off x="3800475" y="85690"/>
+            <a:ext cx="3419475" cy="1200329"/>
+          </a:xfrm>
+          <a:prstGeom prst="rect">
+            <a:avLst/>
+          </a:prstGeom>
+          <a:noFill/>
+        </p:spPr>
+        <p:txBody>
+          <a:bodyPr wrap="square" rtlCol="0">
+            <a:spAutoFit/>
+          </a:bodyPr>
+          <a:lstStyle/>
+          <a:p>
+            <a:r>
+              <a:rPr lang="tr-TR" dirty="0" smtClean="0"/>
+              <a:t>K = 0.25 -&gt; </a:t>
+            </a:r>
+            <a:r>
+              <a:rPr lang="tr-TR" b="1" dirty="0" smtClean="0"/>
+              <a:t>No synch. switch</a:t>
+            </a:r>
+            <a:br>
+              <a:rPr lang="tr-TR" b="1" dirty="0" smtClean="0"/>
+            </a:br>
+            <a:r>
+              <a:rPr lang="tr-TR" dirty="0" smtClean="0"/>
+              <a:t>Vin = 540V</a:t>
+            </a:r>
+          </a:p>
+          <a:p>
+            <a:r>
+              <a:rPr lang="tr-TR" dirty="0" smtClean="0"/>
+              <a:t>Vout </a:t>
+            </a:r>
+            <a:r>
+              <a:rPr lang="tr-TR" dirty="0"/>
+              <a:t>= </a:t>
+            </a:r>
+            <a:r>
+              <a:rPr lang="tr-TR" dirty="0" smtClean="0"/>
+              <a:t>400V, Pout = 8 kW </a:t>
+            </a:r>
+          </a:p>
+          <a:p>
+            <a:r>
+              <a:rPr lang="tr-TR" dirty="0"/>
+              <a:t>fsw = 100 </a:t>
+            </a:r>
+            <a:r>
+              <a:rPr lang="tr-TR" dirty="0" smtClean="0"/>
+              <a:t>kHz, Tj = 25˚C</a:t>
+            </a:r>
+            <a:endParaRPr lang="tr-TR" dirty="0"/>
+          </a:p>
+        </p:txBody>
+      </p:sp>
+      <p:pic>
+        <p:nvPicPr>
+          <p:cNvPr id="6" name="Picture 5"/>
+          <p:cNvPicPr>
+            <a:picLocks noChangeAspect="1"/>
+          </p:cNvPicPr>
+          <p:nvPr/>
+        </p:nvPicPr>
+        <p:blipFill>
+          <a:blip r:embed="rId2"/>
+          <a:stretch>
+            <a:fillRect/>
+          </a:stretch>
+        </p:blipFill>
+        <p:spPr>
+          <a:xfrm>
+            <a:off x="309562" y="1495425"/>
+            <a:ext cx="5200650" cy="4514850"/>
+          </a:xfrm>
+          <a:prstGeom prst="rect">
+            <a:avLst/>
+          </a:prstGeom>
+        </p:spPr>
+      </p:pic>
+      <p:sp>
+        <p:nvSpPr>
+          <p:cNvPr id="9" name="TextBox 8"/>
+          <p:cNvSpPr txBox="1"/>
+          <p:nvPr/>
+        </p:nvSpPr>
+        <p:spPr>
+          <a:xfrm>
+            <a:off x="2324100" y="1126093"/>
+            <a:ext cx="1943100" cy="369332"/>
+          </a:xfrm>
+          <a:prstGeom prst="rect">
+            <a:avLst/>
+          </a:prstGeom>
+          <a:noFill/>
+        </p:spPr>
+        <p:txBody>
+          <a:bodyPr wrap="square" rtlCol="0">
+            <a:spAutoFit/>
+          </a:bodyPr>
+          <a:lstStyle/>
+          <a:p>
+            <a:r>
+              <a:rPr lang="tr-TR" dirty="0" smtClean="0"/>
+              <a:t>Top Switch</a:t>
+            </a:r>
+            <a:endParaRPr lang="tr-TR" dirty="0"/>
+          </a:p>
+        </p:txBody>
+      </p:sp>
+      <p:sp>
+        <p:nvSpPr>
+          <p:cNvPr id="10" name="TextBox 9"/>
+          <p:cNvSpPr txBox="1"/>
+          <p:nvPr/>
+        </p:nvSpPr>
+        <p:spPr>
+          <a:xfrm>
+            <a:off x="2676525" y="2343150"/>
+            <a:ext cx="2247900" cy="830997"/>
+          </a:xfrm>
+          <a:prstGeom prst="rect">
+            <a:avLst/>
+          </a:prstGeom>
+          <a:noFill/>
+        </p:spPr>
+        <p:txBody>
+          <a:bodyPr wrap="square" rtlCol="0">
+            <a:spAutoFit/>
+          </a:bodyPr>
+          <a:lstStyle/>
+          <a:p>
+            <a:r>
+              <a:rPr lang="tr-TR" sz="2400" dirty="0" smtClean="0"/>
+              <a:t>Power Loss</a:t>
+            </a:r>
+            <a:br>
+              <a:rPr lang="tr-TR" sz="2400" dirty="0" smtClean="0"/>
+            </a:br>
+            <a:r>
+              <a:rPr lang="tr-TR" sz="2400" b="1" dirty="0" smtClean="0"/>
+              <a:t>7.1296 W</a:t>
+            </a:r>
+            <a:endParaRPr lang="tr-TR" sz="2400" b="1" dirty="0"/>
+          </a:p>
+        </p:txBody>
+      </p:sp>
+      <p:pic>
+        <p:nvPicPr>
+          <p:cNvPr id="12" name="Picture 11"/>
+          <p:cNvPicPr>
+            <a:picLocks noChangeAspect="1"/>
+          </p:cNvPicPr>
+          <p:nvPr/>
+        </p:nvPicPr>
+        <p:blipFill>
+          <a:blip r:embed="rId3"/>
+          <a:stretch>
+            <a:fillRect/>
+          </a:stretch>
+        </p:blipFill>
+        <p:spPr>
+          <a:xfrm>
+            <a:off x="6281738" y="1495425"/>
+            <a:ext cx="5200650" cy="4514850"/>
+          </a:xfrm>
+          <a:prstGeom prst="rect">
+            <a:avLst/>
+          </a:prstGeom>
+        </p:spPr>
+      </p:pic>
+      <p:sp>
+        <p:nvSpPr>
+          <p:cNvPr id="13" name="TextBox 12"/>
+          <p:cNvSpPr txBox="1"/>
+          <p:nvPr/>
+        </p:nvSpPr>
+        <p:spPr>
+          <a:xfrm>
+            <a:off x="8277225" y="1149350"/>
+            <a:ext cx="1943100" cy="369332"/>
+          </a:xfrm>
+          <a:prstGeom prst="rect">
+            <a:avLst/>
+          </a:prstGeom>
+          <a:noFill/>
+        </p:spPr>
+        <p:txBody>
+          <a:bodyPr wrap="square" rtlCol="0">
+            <a:spAutoFit/>
+          </a:bodyPr>
+          <a:lstStyle/>
+          <a:p>
+            <a:r>
+              <a:rPr lang="tr-TR" dirty="0" smtClean="0"/>
+              <a:t>Bottom Switch</a:t>
+            </a:r>
+            <a:endParaRPr lang="tr-TR" dirty="0"/>
+          </a:p>
+        </p:txBody>
+      </p:sp>
+      <p:sp>
+        <p:nvSpPr>
+          <p:cNvPr id="14" name="TextBox 13"/>
+          <p:cNvSpPr txBox="1"/>
+          <p:nvPr/>
+        </p:nvSpPr>
+        <p:spPr>
+          <a:xfrm>
+            <a:off x="9234488" y="2343150"/>
+            <a:ext cx="2247900" cy="830997"/>
+          </a:xfrm>
+          <a:prstGeom prst="rect">
+            <a:avLst/>
+          </a:prstGeom>
+          <a:noFill/>
+        </p:spPr>
+        <p:txBody>
+          <a:bodyPr wrap="square" rtlCol="0">
+            <a:spAutoFit/>
+          </a:bodyPr>
+          <a:lstStyle/>
+          <a:p>
+            <a:r>
+              <a:rPr lang="tr-TR" sz="2400" dirty="0" smtClean="0"/>
+              <a:t>Power Loss</a:t>
+            </a:r>
+            <a:br>
+              <a:rPr lang="tr-TR" sz="2400" dirty="0" smtClean="0"/>
+            </a:br>
+            <a:r>
+              <a:rPr lang="tr-TR" sz="2400" b="1" dirty="0" smtClean="0"/>
+              <a:t>0.432 W</a:t>
+            </a:r>
+            <a:endParaRPr lang="tr-TR" sz="2400" b="1" dirty="0"/>
+          </a:p>
+        </p:txBody>
+      </p:sp>
+      <p:sp>
+        <p:nvSpPr>
+          <p:cNvPr id="15" name="TextBox 14"/>
+          <p:cNvSpPr txBox="1"/>
+          <p:nvPr/>
+        </p:nvSpPr>
+        <p:spPr>
+          <a:xfrm>
+            <a:off x="3433763" y="6198255"/>
+            <a:ext cx="5695950" cy="523220"/>
+          </a:xfrm>
+          <a:prstGeom prst="rect">
+            <a:avLst/>
+          </a:prstGeom>
+          <a:noFill/>
+        </p:spPr>
+        <p:txBody>
+          <a:bodyPr wrap="square" rtlCol="0">
+            <a:spAutoFit/>
+          </a:bodyPr>
+          <a:lstStyle/>
+          <a:p>
+            <a:r>
+              <a:rPr lang="tr-TR" sz="2800" b="1" dirty="0" smtClean="0"/>
+              <a:t>Total Transistor Loss = 30.2464 W</a:t>
+            </a:r>
+            <a:endParaRPr lang="tr-TR" sz="2800" b="1" dirty="0"/>
+          </a:p>
+        </p:txBody>
+      </p:sp>
+      <p:sp>
+        <p:nvSpPr>
+          <p:cNvPr id="16" name="TextBox 15"/>
+          <p:cNvSpPr txBox="1"/>
+          <p:nvPr/>
+        </p:nvSpPr>
+        <p:spPr>
+          <a:xfrm>
+            <a:off x="8177213" y="455021"/>
+            <a:ext cx="2114550" cy="461665"/>
+          </a:xfrm>
+          <a:prstGeom prst="rect">
+            <a:avLst/>
+          </a:prstGeom>
+          <a:noFill/>
+        </p:spPr>
+        <p:txBody>
+          <a:bodyPr wrap="square" rtlCol="0">
+            <a:spAutoFit/>
+          </a:bodyPr>
+          <a:lstStyle/>
+          <a:p>
+            <a:r>
+              <a:rPr lang="tr-TR" sz="2400" b="1" dirty="0" smtClean="0"/>
+              <a:t>4 App Ripple</a:t>
+            </a:r>
+            <a:endParaRPr lang="tr-TR" sz="2400" b="1" dirty="0"/>
+          </a:p>
+        </p:txBody>
+      </p:sp>
+    </p:spTree>
+    <p:extLst>
+      <p:ext uri="{BB962C8B-B14F-4D97-AF65-F5344CB8AC3E}">
+        <p14:creationId xmlns:p14="http://schemas.microsoft.com/office/powerpoint/2010/main" val="2883659860"/>
       </p:ext>
     </p:extLst>
   </p:cSld>

</xml_diff>